<commit_message>
Reintroducir objetivo y modelo en la presentación
Se reintrodujo los datos que se borraron de los objetivos y se agrego en la presentación el modelo de nuestro problema
</commit_message>
<xml_diff>
--- a/Presentación módulo 3.pptx
+++ b/Presentación módulo 3.pptx
@@ -7,6 +7,7 @@
   <p:sldIdLst>
     <p:sldId id="256" r:id="rId2"/>
     <p:sldId id="257" r:id="rId3"/>
+    <p:sldId id="258" r:id="rId4"/>
   </p:sldIdLst>
   <p:sldSz cx="12192000" cy="6858000"/>
   <p:notesSz cx="6858000" cy="9144000"/>
@@ -529,7 +530,7 @@
           <a:p>
             <a:fld id="{073ED0CC-082F-4160-86E5-0D6041F12778}" type="datetime1">
               <a:rPr lang="en-US" smtClean="0"/>
-              <a:t>11/28/2019</a:t>
+              <a:t>11/29/2019</a:t>
             </a:fld>
             <a:endParaRPr lang="en-US" dirty="0"/>
           </a:p>
@@ -821,7 +822,7 @@
           <a:p>
             <a:fld id="{073ED0CC-082F-4160-86E5-0D6041F12778}" type="datetime1">
               <a:rPr lang="en-US" smtClean="0"/>
-              <a:t>11/28/2019</a:t>
+              <a:t>11/29/2019</a:t>
             </a:fld>
             <a:endParaRPr lang="en-US" dirty="0"/>
           </a:p>
@@ -1081,7 +1082,7 @@
           <a:p>
             <a:fld id="{073ED0CC-082F-4160-86E5-0D6041F12778}" type="datetime1">
               <a:rPr lang="en-US" smtClean="0"/>
-              <a:t>11/28/2019</a:t>
+              <a:t>11/29/2019</a:t>
             </a:fld>
             <a:endParaRPr lang="en-US" dirty="0"/>
           </a:p>
@@ -1551,7 +1552,7 @@
           <a:p>
             <a:fld id="{073ED0CC-082F-4160-86E5-0D6041F12778}" type="datetime1">
               <a:rPr lang="en-US" smtClean="0"/>
-              <a:t>11/28/2019</a:t>
+              <a:t>11/29/2019</a:t>
             </a:fld>
             <a:endParaRPr lang="en-US" dirty="0"/>
           </a:p>
@@ -1732,7 +1733,7 @@
           <a:p>
             <a:fld id="{073ED0CC-082F-4160-86E5-0D6041F12778}" type="datetime1">
               <a:rPr lang="en-US" smtClean="0"/>
-              <a:t>11/28/2019</a:t>
+              <a:t>11/29/2019</a:t>
             </a:fld>
             <a:endParaRPr lang="en-US" dirty="0"/>
           </a:p>
@@ -2309,7 +2310,7 @@
           <a:p>
             <a:fld id="{073ED0CC-082F-4160-86E5-0D6041F12778}" type="datetime1">
               <a:rPr lang="en-US" smtClean="0"/>
-              <a:t>11/28/2019</a:t>
+              <a:t>11/29/2019</a:t>
             </a:fld>
             <a:endParaRPr lang="en-US" dirty="0"/>
           </a:p>
@@ -2642,7 +2643,7 @@
           <a:p>
             <a:fld id="{073ED0CC-082F-4160-86E5-0D6041F12778}" type="datetime1">
               <a:rPr lang="en-US" smtClean="0"/>
-              <a:t>11/28/2019</a:t>
+              <a:t>11/29/2019</a:t>
             </a:fld>
             <a:endParaRPr lang="en-US" dirty="0"/>
           </a:p>
@@ -2818,7 +2819,7 @@
           <a:p>
             <a:fld id="{073ED0CC-082F-4160-86E5-0D6041F12778}" type="datetime1">
               <a:rPr lang="en-US" smtClean="0"/>
-              <a:t>11/28/2019</a:t>
+              <a:t>11/29/2019</a:t>
             </a:fld>
             <a:endParaRPr lang="en-US" dirty="0"/>
           </a:p>
@@ -2999,7 +3000,7 @@
           <a:p>
             <a:fld id="{073ED0CC-082F-4160-86E5-0D6041F12778}" type="datetime1">
               <a:rPr lang="en-US" smtClean="0"/>
-              <a:t>11/28/2019</a:t>
+              <a:t>11/29/2019</a:t>
             </a:fld>
             <a:endParaRPr lang="en-US" dirty="0"/>
           </a:p>
@@ -3170,7 +3171,7 @@
           <a:p>
             <a:fld id="{073ED0CC-082F-4160-86E5-0D6041F12778}" type="datetime1">
               <a:rPr lang="en-US" smtClean="0"/>
-              <a:t>11/28/2019</a:t>
+              <a:t>11/29/2019</a:t>
             </a:fld>
             <a:endParaRPr lang="en-US" dirty="0"/>
           </a:p>
@@ -3428,7 +3429,7 @@
           <a:p>
             <a:fld id="{073ED0CC-082F-4160-86E5-0D6041F12778}" type="datetime1">
               <a:rPr lang="en-US" smtClean="0"/>
-              <a:t>11/28/2019</a:t>
+              <a:t>11/29/2019</a:t>
             </a:fld>
             <a:endParaRPr lang="en-US" dirty="0"/>
           </a:p>
@@ -3721,7 +3722,7 @@
           <a:p>
             <a:fld id="{073ED0CC-082F-4160-86E5-0D6041F12778}" type="datetime1">
               <a:rPr lang="en-US" smtClean="0"/>
-              <a:t>11/28/2019</a:t>
+              <a:t>11/29/2019</a:t>
             </a:fld>
             <a:endParaRPr lang="en-US" dirty="0"/>
           </a:p>
@@ -4152,7 +4153,7 @@
           <a:p>
             <a:fld id="{073ED0CC-082F-4160-86E5-0D6041F12778}" type="datetime1">
               <a:rPr lang="en-US" smtClean="0"/>
-              <a:t>11/28/2019</a:t>
+              <a:t>11/29/2019</a:t>
             </a:fld>
             <a:endParaRPr lang="en-US" dirty="0"/>
           </a:p>
@@ -4271,7 +4272,7 @@
           <a:p>
             <a:fld id="{073ED0CC-082F-4160-86E5-0D6041F12778}" type="datetime1">
               <a:rPr lang="en-US" smtClean="0"/>
-              <a:t>11/28/2019</a:t>
+              <a:t>11/29/2019</a:t>
             </a:fld>
             <a:endParaRPr lang="en-US" dirty="0"/>
           </a:p>
@@ -4367,7 +4368,7 @@
           <a:p>
             <a:fld id="{073ED0CC-082F-4160-86E5-0D6041F12778}" type="datetime1">
               <a:rPr lang="en-US" smtClean="0"/>
-              <a:t>11/28/2019</a:t>
+              <a:t>11/29/2019</a:t>
             </a:fld>
             <a:endParaRPr lang="en-US" dirty="0"/>
           </a:p>
@@ -4651,7 +4652,7 @@
           <a:p>
             <a:fld id="{073ED0CC-082F-4160-86E5-0D6041F12778}" type="datetime1">
               <a:rPr lang="en-US" smtClean="0"/>
-              <a:t>11/28/2019</a:t>
+              <a:t>11/29/2019</a:t>
             </a:fld>
             <a:endParaRPr lang="en-US" dirty="0"/>
           </a:p>
@@ -4943,7 +4944,7 @@
           <a:p>
             <a:fld id="{073ED0CC-082F-4160-86E5-0D6041F12778}" type="datetime1">
               <a:rPr lang="en-US" smtClean="0"/>
-              <a:t>11/28/2019</a:t>
+              <a:t>11/29/2019</a:t>
             </a:fld>
             <a:endParaRPr lang="en-US" dirty="0"/>
           </a:p>
@@ -5175,7 +5176,7 @@
           <a:p>
             <a:fld id="{073ED0CC-082F-4160-86E5-0D6041F12778}" type="datetime1">
               <a:rPr lang="en-US" smtClean="0"/>
-              <a:t>11/28/2019</a:t>
+              <a:t>11/29/2019</a:t>
             </a:fld>
             <a:endParaRPr lang="en-US" dirty="0"/>
           </a:p>
@@ -6619,43 +6620,745 @@
               <a:t>Mediante el uso de lo aprendido en el Módulo 3 resolver correctamente la ecuación de resortes acoplados.</a:t>
             </a:r>
           </a:p>
-          <a:p>
-            <a:r>
-              <a:rPr lang="es-ES" dirty="0"/>
-              <a:t>Utilizar la función </a:t>
-            </a:r>
-            <a:r>
-              <a:rPr lang="es-ES" dirty="0" err="1"/>
-              <a:t>signal</a:t>
-            </a:r>
-            <a:r>
-              <a:rPr lang="es-ES" dirty="0"/>
-              <a:t> de la librería </a:t>
-            </a:r>
-            <a:r>
-              <a:rPr lang="es-ES" dirty="0" err="1"/>
-              <a:t>scipy</a:t>
-            </a:r>
-            <a:r>
-              <a:rPr lang="es-ES" dirty="0"/>
-              <a:t>(</a:t>
-            </a:r>
-            <a:r>
-              <a:rPr lang="es-ES" dirty="0" err="1"/>
-              <a:t>scipy.signal</a:t>
-            </a:r>
-            <a:r>
-              <a:rPr lang="es-ES" dirty="0"/>
-              <a:t>)</a:t>
-            </a:r>
-            <a:endParaRPr lang="es-MX" dirty="0"/>
-          </a:p>
         </p:txBody>
       </p:sp>
     </p:spTree>
     <p:extLst>
       <p:ext uri="{BB962C8B-B14F-4D97-AF65-F5344CB8AC3E}">
         <p14:creationId xmlns:p14="http://schemas.microsoft.com/office/powerpoint/2010/main" val="2668546851"/>
+      </p:ext>
+    </p:extLst>
+  </p:cSld>
+  <p:clrMapOvr>
+    <a:masterClrMapping/>
+  </p:clrMapOvr>
+</p:sld>
+</file>
+
+<file path=ppt/slides/slide3.xml><?xml version="1.0" encoding="utf-8"?>
+<p:sld xmlns:a="http://schemas.openxmlformats.org/drawingml/2006/main" xmlns:r="http://schemas.openxmlformats.org/officeDocument/2006/relationships" xmlns:p="http://schemas.openxmlformats.org/presentationml/2006/main">
+  <p:cSld>
+    <p:spTree>
+      <p:nvGrpSpPr>
+        <p:cNvPr id="1" name=""/>
+        <p:cNvGrpSpPr/>
+        <p:nvPr/>
+      </p:nvGrpSpPr>
+      <p:grpSpPr>
+        <a:xfrm>
+          <a:off x="0" y="0"/>
+          <a:ext cx="0" cy="0"/>
+          <a:chOff x="0" y="0"/>
+          <a:chExt cx="0" cy="0"/>
+        </a:xfrm>
+      </p:grpSpPr>
+      <p:sp>
+        <p:nvSpPr>
+          <p:cNvPr id="2" name="Título 1">
+            <a:extLst>
+              <a:ext uri="{FF2B5EF4-FFF2-40B4-BE49-F238E27FC236}">
+                <a16:creationId xmlns:a16="http://schemas.microsoft.com/office/drawing/2014/main" id="{268D9272-DED4-407C-8B4F-48A90C1FCC15}"/>
+              </a:ext>
+            </a:extLst>
+          </p:cNvPr>
+          <p:cNvSpPr>
+            <a:spLocks noGrp="1"/>
+          </p:cNvSpPr>
+          <p:nvPr>
+            <p:ph type="title"/>
+          </p:nvPr>
+        </p:nvSpPr>
+        <p:spPr>
+          <a:xfrm>
+            <a:off x="1141413" y="300110"/>
+            <a:ext cx="9905998" cy="1905000"/>
+          </a:xfrm>
+        </p:spPr>
+        <p:txBody>
+          <a:bodyPr/>
+          <a:lstStyle/>
+          <a:p>
+            <a:r>
+              <a:rPr lang="es-MX" dirty="0"/>
+              <a:t>Modelo que representa el problema.</a:t>
+            </a:r>
+          </a:p>
+        </p:txBody>
+      </p:sp>
+      <mc:AlternateContent xmlns:mc="http://schemas.openxmlformats.org/markup-compatibility/2006">
+        <mc:Choice xmlns:a14="http://schemas.microsoft.com/office/drawing/2010/main" Requires="a14">
+          <p:sp>
+            <p:nvSpPr>
+              <p:cNvPr id="3" name="Marcador de contenido 2">
+                <a:extLst>
+                  <a:ext uri="{FF2B5EF4-FFF2-40B4-BE49-F238E27FC236}">
+                    <a16:creationId xmlns:a16="http://schemas.microsoft.com/office/drawing/2014/main" id="{D6CB29A0-D6AB-4E53-887C-372C6C3EB72E}"/>
+                  </a:ext>
+                </a:extLst>
+              </p:cNvPr>
+              <p:cNvSpPr>
+                <a:spLocks noGrp="1"/>
+              </p:cNvSpPr>
+              <p:nvPr>
+                <p:ph idx="1"/>
+              </p:nvPr>
+            </p:nvSpPr>
+            <p:spPr>
+              <a:xfrm>
+                <a:off x="1141413" y="1752599"/>
+                <a:ext cx="9905998" cy="3124201"/>
+              </a:xfrm>
+            </p:spPr>
+            <p:txBody>
+              <a:bodyPr/>
+              <a:lstStyle/>
+              <a:p>
+                <a:r>
+                  <a:rPr lang="es-MX" dirty="0"/>
+                  <a:t>El modelo que representa el problema esta representado por las siguientes ecuaciones diferenciales:</a:t>
+                </a:r>
+              </a:p>
+              <a:p>
+                <a:pPr marL="0" indent="0">
+                  <a:buNone/>
+                </a:pPr>
+                <a14:m>
+                  <m:oMathPara xmlns:m="http://schemas.openxmlformats.org/officeDocument/2006/math">
+                    <m:oMathParaPr>
+                      <m:jc m:val="centerGroup"/>
+                    </m:oMathParaPr>
+                    <m:oMath xmlns:m="http://schemas.openxmlformats.org/officeDocument/2006/math">
+                      <m:r>
+                        <a:rPr lang="es-MX" b="0" i="1" smtClean="0">
+                          <a:latin typeface="Cambria Math" panose="02040503050406030204" pitchFamily="18" charset="0"/>
+                        </a:rPr>
+                        <m:t>𝐹</m:t>
+                      </m:r>
+                      <m:r>
+                        <a:rPr lang="es-MX" b="0" i="1" smtClean="0">
+                          <a:latin typeface="Cambria Math" panose="02040503050406030204" pitchFamily="18" charset="0"/>
+                          <a:ea typeface="Cambria Math" panose="02040503050406030204" pitchFamily="18" charset="0"/>
+                        </a:rPr>
+                        <m:t>=</m:t>
+                      </m:r>
+                      <m:sSub>
+                        <m:sSubPr>
+                          <m:ctrlPr>
+                            <a:rPr lang="es-MX" b="0" i="1" smtClean="0">
+                              <a:latin typeface="Cambria Math" panose="02040503050406030204" pitchFamily="18" charset="0"/>
+                              <a:ea typeface="Cambria Math" panose="02040503050406030204" pitchFamily="18" charset="0"/>
+                            </a:rPr>
+                          </m:ctrlPr>
+                        </m:sSubPr>
+                        <m:e>
+                          <m:r>
+                            <a:rPr lang="es-MX" b="0" i="1" smtClean="0">
+                              <a:latin typeface="Cambria Math" panose="02040503050406030204" pitchFamily="18" charset="0"/>
+                              <a:ea typeface="Cambria Math" panose="02040503050406030204" pitchFamily="18" charset="0"/>
+                            </a:rPr>
+                            <m:t>𝑚</m:t>
+                          </m:r>
+                        </m:e>
+                        <m:sub>
+                          <m:r>
+                            <a:rPr lang="es-MX" b="0" i="1" smtClean="0">
+                              <a:latin typeface="Cambria Math" panose="02040503050406030204" pitchFamily="18" charset="0"/>
+                              <a:ea typeface="Cambria Math" panose="02040503050406030204" pitchFamily="18" charset="0"/>
+                            </a:rPr>
+                            <m:t>1</m:t>
+                          </m:r>
+                        </m:sub>
+                      </m:sSub>
+                      <m:f>
+                        <m:fPr>
+                          <m:ctrlPr>
+                            <a:rPr lang="es-MX" b="0" i="1" smtClean="0">
+                              <a:latin typeface="Cambria Math" panose="02040503050406030204" pitchFamily="18" charset="0"/>
+                              <a:ea typeface="Cambria Math" panose="02040503050406030204" pitchFamily="18" charset="0"/>
+                            </a:rPr>
+                          </m:ctrlPr>
+                        </m:fPr>
+                        <m:num>
+                          <m:sSup>
+                            <m:sSupPr>
+                              <m:ctrlPr>
+                                <a:rPr lang="es-MX" b="0" i="1" smtClean="0">
+                                  <a:latin typeface="Cambria Math" panose="02040503050406030204" pitchFamily="18" charset="0"/>
+                                  <a:ea typeface="Cambria Math" panose="02040503050406030204" pitchFamily="18" charset="0"/>
+                                </a:rPr>
+                              </m:ctrlPr>
+                            </m:sSupPr>
+                            <m:e>
+                              <m:r>
+                                <a:rPr lang="es-MX" b="0" i="1" smtClean="0">
+                                  <a:latin typeface="Cambria Math" panose="02040503050406030204" pitchFamily="18" charset="0"/>
+                                  <a:ea typeface="Cambria Math" panose="02040503050406030204" pitchFamily="18" charset="0"/>
+                                </a:rPr>
+                                <m:t>𝑑</m:t>
+                              </m:r>
+                            </m:e>
+                            <m:sup>
+                              <m:r>
+                                <a:rPr lang="es-MX" b="0" i="1" smtClean="0">
+                                  <a:latin typeface="Cambria Math" panose="02040503050406030204" pitchFamily="18" charset="0"/>
+                                  <a:ea typeface="Cambria Math" panose="02040503050406030204" pitchFamily="18" charset="0"/>
+                                </a:rPr>
+                                <m:t>2</m:t>
+                              </m:r>
+                            </m:sup>
+                          </m:sSup>
+                          <m:sSub>
+                            <m:sSubPr>
+                              <m:ctrlPr>
+                                <a:rPr lang="es-MX" b="0" i="1" smtClean="0">
+                                  <a:latin typeface="Cambria Math" panose="02040503050406030204" pitchFamily="18" charset="0"/>
+                                  <a:ea typeface="Cambria Math" panose="02040503050406030204" pitchFamily="18" charset="0"/>
+                                </a:rPr>
+                              </m:ctrlPr>
+                            </m:sSubPr>
+                            <m:e>
+                              <m:r>
+                                <a:rPr lang="es-MX" b="0" i="1" smtClean="0">
+                                  <a:latin typeface="Cambria Math" panose="02040503050406030204" pitchFamily="18" charset="0"/>
+                                  <a:ea typeface="Cambria Math" panose="02040503050406030204" pitchFamily="18" charset="0"/>
+                                </a:rPr>
+                                <m:t>𝑥</m:t>
+                              </m:r>
+                            </m:e>
+                            <m:sub>
+                              <m:r>
+                                <a:rPr lang="es-MX" b="0" i="1" smtClean="0">
+                                  <a:latin typeface="Cambria Math" panose="02040503050406030204" pitchFamily="18" charset="0"/>
+                                  <a:ea typeface="Cambria Math" panose="02040503050406030204" pitchFamily="18" charset="0"/>
+                                </a:rPr>
+                                <m:t>1</m:t>
+                              </m:r>
+                            </m:sub>
+                          </m:sSub>
+                        </m:num>
+                        <m:den>
+                          <m:r>
+                            <a:rPr lang="es-MX" b="0" i="1" smtClean="0">
+                              <a:latin typeface="Cambria Math" panose="02040503050406030204" pitchFamily="18" charset="0"/>
+                              <a:ea typeface="Cambria Math" panose="02040503050406030204" pitchFamily="18" charset="0"/>
+                            </a:rPr>
+                            <m:t>𝑑</m:t>
+                          </m:r>
+                          <m:sSup>
+                            <m:sSupPr>
+                              <m:ctrlPr>
+                                <a:rPr lang="es-MX" b="0" i="1" smtClean="0">
+                                  <a:latin typeface="Cambria Math" panose="02040503050406030204" pitchFamily="18" charset="0"/>
+                                  <a:ea typeface="Cambria Math" panose="02040503050406030204" pitchFamily="18" charset="0"/>
+                                </a:rPr>
+                              </m:ctrlPr>
+                            </m:sSupPr>
+                            <m:e>
+                              <m:r>
+                                <a:rPr lang="es-MX" b="0" i="1" smtClean="0">
+                                  <a:latin typeface="Cambria Math" panose="02040503050406030204" pitchFamily="18" charset="0"/>
+                                  <a:ea typeface="Cambria Math" panose="02040503050406030204" pitchFamily="18" charset="0"/>
+                                </a:rPr>
+                                <m:t>𝑡</m:t>
+                              </m:r>
+                            </m:e>
+                            <m:sup>
+                              <m:r>
+                                <a:rPr lang="es-MX" b="0" i="1" smtClean="0">
+                                  <a:latin typeface="Cambria Math" panose="02040503050406030204" pitchFamily="18" charset="0"/>
+                                  <a:ea typeface="Cambria Math" panose="02040503050406030204" pitchFamily="18" charset="0"/>
+                                </a:rPr>
+                                <m:t>2</m:t>
+                              </m:r>
+                            </m:sup>
+                          </m:sSup>
+                        </m:den>
+                      </m:f>
+                      <m:r>
+                        <a:rPr lang="es-MX" b="0" i="1" smtClean="0">
+                          <a:latin typeface="Cambria Math" panose="02040503050406030204" pitchFamily="18" charset="0"/>
+                          <a:ea typeface="Cambria Math" panose="02040503050406030204" pitchFamily="18" charset="0"/>
+                        </a:rPr>
+                        <m:t>=</m:t>
+                      </m:r>
+                      <m:r>
+                        <a:rPr lang="es-MX" b="0" i="0" smtClean="0">
+                          <a:latin typeface="Cambria Math" panose="02040503050406030204" pitchFamily="18" charset="0"/>
+                          <a:ea typeface="Cambria Math" panose="02040503050406030204" pitchFamily="18" charset="0"/>
+                        </a:rPr>
+                        <m:t>−</m:t>
+                      </m:r>
+                      <m:sSub>
+                        <m:sSubPr>
+                          <m:ctrlPr>
+                            <a:rPr lang="es-MX" b="0" i="1" smtClean="0">
+                              <a:latin typeface="Cambria Math" panose="02040503050406030204" pitchFamily="18" charset="0"/>
+                              <a:ea typeface="Cambria Math" panose="02040503050406030204" pitchFamily="18" charset="0"/>
+                            </a:rPr>
+                          </m:ctrlPr>
+                        </m:sSubPr>
+                        <m:e>
+                          <m:r>
+                            <a:rPr lang="es-MX" b="0" i="1" smtClean="0">
+                              <a:latin typeface="Cambria Math" panose="02040503050406030204" pitchFamily="18" charset="0"/>
+                              <a:ea typeface="Cambria Math" panose="02040503050406030204" pitchFamily="18" charset="0"/>
+                            </a:rPr>
+                            <m:t>𝑘</m:t>
+                          </m:r>
+                        </m:e>
+                        <m:sub>
+                          <m:r>
+                            <a:rPr lang="es-MX" b="0" i="1" smtClean="0">
+                              <a:latin typeface="Cambria Math" panose="02040503050406030204" pitchFamily="18" charset="0"/>
+                              <a:ea typeface="Cambria Math" panose="02040503050406030204" pitchFamily="18" charset="0"/>
+                            </a:rPr>
+                            <m:t>1</m:t>
+                          </m:r>
+                        </m:sub>
+                      </m:sSub>
+                      <m:r>
+                        <a:rPr lang="es-MX" b="0" i="1" smtClean="0">
+                          <a:latin typeface="Cambria Math" panose="02040503050406030204" pitchFamily="18" charset="0"/>
+                          <a:ea typeface="Cambria Math" panose="02040503050406030204" pitchFamily="18" charset="0"/>
+                        </a:rPr>
+                        <m:t>+</m:t>
+                      </m:r>
+                      <m:sSub>
+                        <m:sSubPr>
+                          <m:ctrlPr>
+                            <a:rPr lang="es-MX" b="0" i="1" smtClean="0">
+                              <a:latin typeface="Cambria Math" panose="02040503050406030204" pitchFamily="18" charset="0"/>
+                              <a:ea typeface="Cambria Math" panose="02040503050406030204" pitchFamily="18" charset="0"/>
+                            </a:rPr>
+                          </m:ctrlPr>
+                        </m:sSubPr>
+                        <m:e>
+                          <m:r>
+                            <a:rPr lang="es-MX" b="0" i="1" smtClean="0">
+                              <a:latin typeface="Cambria Math" panose="02040503050406030204" pitchFamily="18" charset="0"/>
+                              <a:ea typeface="Cambria Math" panose="02040503050406030204" pitchFamily="18" charset="0"/>
+                            </a:rPr>
+                            <m:t>𝑘</m:t>
+                          </m:r>
+                        </m:e>
+                        <m:sub>
+                          <m:r>
+                            <a:rPr lang="es-MX" b="0" i="1" smtClean="0">
+                              <a:latin typeface="Cambria Math" panose="02040503050406030204" pitchFamily="18" charset="0"/>
+                              <a:ea typeface="Cambria Math" panose="02040503050406030204" pitchFamily="18" charset="0"/>
+                            </a:rPr>
+                            <m:t>2</m:t>
+                          </m:r>
+                        </m:sub>
+                      </m:sSub>
+                      <m:r>
+                        <a:rPr lang="es-MX" b="0" i="1" smtClean="0">
+                          <a:latin typeface="Cambria Math" panose="02040503050406030204" pitchFamily="18" charset="0"/>
+                          <a:ea typeface="Cambria Math" panose="02040503050406030204" pitchFamily="18" charset="0"/>
+                        </a:rPr>
+                        <m:t>(</m:t>
+                      </m:r>
+                      <m:sSub>
+                        <m:sSubPr>
+                          <m:ctrlPr>
+                            <a:rPr lang="es-MX" b="0" i="1" smtClean="0">
+                              <a:latin typeface="Cambria Math" panose="02040503050406030204" pitchFamily="18" charset="0"/>
+                              <a:ea typeface="Cambria Math" panose="02040503050406030204" pitchFamily="18" charset="0"/>
+                            </a:rPr>
+                          </m:ctrlPr>
+                        </m:sSubPr>
+                        <m:e>
+                          <m:r>
+                            <a:rPr lang="es-MX" b="0" i="1" smtClean="0">
+                              <a:latin typeface="Cambria Math" panose="02040503050406030204" pitchFamily="18" charset="0"/>
+                              <a:ea typeface="Cambria Math" panose="02040503050406030204" pitchFamily="18" charset="0"/>
+                            </a:rPr>
+                            <m:t>𝑥</m:t>
+                          </m:r>
+                        </m:e>
+                        <m:sub>
+                          <m:r>
+                            <a:rPr lang="es-MX" b="0" i="1" smtClean="0">
+                              <a:latin typeface="Cambria Math" panose="02040503050406030204" pitchFamily="18" charset="0"/>
+                              <a:ea typeface="Cambria Math" panose="02040503050406030204" pitchFamily="18" charset="0"/>
+                            </a:rPr>
+                            <m:t>2</m:t>
+                          </m:r>
+                        </m:sub>
+                      </m:sSub>
+                      <m:r>
+                        <a:rPr lang="es-MX" b="0" i="1" smtClean="0">
+                          <a:latin typeface="Cambria Math" panose="02040503050406030204" pitchFamily="18" charset="0"/>
+                          <a:ea typeface="Cambria Math" panose="02040503050406030204" pitchFamily="18" charset="0"/>
+                        </a:rPr>
+                        <m:t>−</m:t>
+                      </m:r>
+                      <m:sSub>
+                        <m:sSubPr>
+                          <m:ctrlPr>
+                            <a:rPr lang="es-MX" b="0" i="1" smtClean="0">
+                              <a:latin typeface="Cambria Math" panose="02040503050406030204" pitchFamily="18" charset="0"/>
+                              <a:ea typeface="Cambria Math" panose="02040503050406030204" pitchFamily="18" charset="0"/>
+                            </a:rPr>
+                          </m:ctrlPr>
+                        </m:sSubPr>
+                        <m:e>
+                          <m:r>
+                            <a:rPr lang="es-MX" b="0" i="1" smtClean="0">
+                              <a:latin typeface="Cambria Math" panose="02040503050406030204" pitchFamily="18" charset="0"/>
+                              <a:ea typeface="Cambria Math" panose="02040503050406030204" pitchFamily="18" charset="0"/>
+                            </a:rPr>
+                            <m:t>𝑥</m:t>
+                          </m:r>
+                        </m:e>
+                        <m:sub>
+                          <m:r>
+                            <a:rPr lang="es-MX" b="0" i="1" smtClean="0">
+                              <a:latin typeface="Cambria Math" panose="02040503050406030204" pitchFamily="18" charset="0"/>
+                              <a:ea typeface="Cambria Math" panose="02040503050406030204" pitchFamily="18" charset="0"/>
+                            </a:rPr>
+                            <m:t>1</m:t>
+                          </m:r>
+                        </m:sub>
+                      </m:sSub>
+                      <m:r>
+                        <a:rPr lang="es-MX" b="0" i="1" smtClean="0">
+                          <a:latin typeface="Cambria Math" panose="02040503050406030204" pitchFamily="18" charset="0"/>
+                          <a:ea typeface="Cambria Math" panose="02040503050406030204" pitchFamily="18" charset="0"/>
+                        </a:rPr>
+                        <m:t>)</m:t>
+                      </m:r>
+                    </m:oMath>
+                  </m:oMathPara>
+                </a14:m>
+                <a:endParaRPr lang="es-MX" dirty="0"/>
+              </a:p>
+              <a:p>
+                <a:pPr marL="0" indent="0">
+                  <a:buNone/>
+                </a:pPr>
+                <a14:m>
+                  <m:oMathPara xmlns:m="http://schemas.openxmlformats.org/officeDocument/2006/math">
+                    <m:oMathParaPr>
+                      <m:jc m:val="centerGroup"/>
+                    </m:oMathParaPr>
+                    <m:oMath xmlns:m="http://schemas.openxmlformats.org/officeDocument/2006/math">
+                      <m:r>
+                        <a:rPr lang="es-MX" b="0" i="1" smtClean="0">
+                          <a:latin typeface="Cambria Math" panose="02040503050406030204" pitchFamily="18" charset="0"/>
+                        </a:rPr>
+                        <m:t>𝐹</m:t>
+                      </m:r>
+                      <m:r>
+                        <a:rPr lang="es-MX" b="0" i="1" smtClean="0">
+                          <a:latin typeface="Cambria Math" panose="02040503050406030204" pitchFamily="18" charset="0"/>
+                        </a:rPr>
+                        <m:t>=</m:t>
+                      </m:r>
+                      <m:sSub>
+                        <m:sSubPr>
+                          <m:ctrlPr>
+                            <a:rPr lang="es-MX" b="0" i="1" smtClean="0">
+                              <a:latin typeface="Cambria Math" panose="02040503050406030204" pitchFamily="18" charset="0"/>
+                            </a:rPr>
+                          </m:ctrlPr>
+                        </m:sSubPr>
+                        <m:e>
+                          <m:r>
+                            <a:rPr lang="es-MX" b="0" i="1" smtClean="0">
+                              <a:latin typeface="Cambria Math" panose="02040503050406030204" pitchFamily="18" charset="0"/>
+                            </a:rPr>
+                            <m:t>𝑚</m:t>
+                          </m:r>
+                        </m:e>
+                        <m:sub>
+                          <m:r>
+                            <a:rPr lang="es-MX" b="0" i="1" smtClean="0">
+                              <a:latin typeface="Cambria Math" panose="02040503050406030204" pitchFamily="18" charset="0"/>
+                            </a:rPr>
+                            <m:t>2</m:t>
+                          </m:r>
+                        </m:sub>
+                      </m:sSub>
+                      <m:f>
+                        <m:fPr>
+                          <m:ctrlPr>
+                            <a:rPr lang="es-MX" b="0" i="1" smtClean="0">
+                              <a:latin typeface="Cambria Math" panose="02040503050406030204" pitchFamily="18" charset="0"/>
+                            </a:rPr>
+                          </m:ctrlPr>
+                        </m:fPr>
+                        <m:num>
+                          <m:sSup>
+                            <m:sSupPr>
+                              <m:ctrlPr>
+                                <a:rPr lang="es-MX" b="0" i="1" smtClean="0">
+                                  <a:latin typeface="Cambria Math" panose="02040503050406030204" pitchFamily="18" charset="0"/>
+                                </a:rPr>
+                              </m:ctrlPr>
+                            </m:sSupPr>
+                            <m:e>
+                              <m:r>
+                                <a:rPr lang="es-MX" b="0" i="1" smtClean="0">
+                                  <a:latin typeface="Cambria Math" panose="02040503050406030204" pitchFamily="18" charset="0"/>
+                                </a:rPr>
+                                <m:t>𝑑</m:t>
+                              </m:r>
+                            </m:e>
+                            <m:sup>
+                              <m:r>
+                                <a:rPr lang="es-MX" b="0" i="1" smtClean="0">
+                                  <a:latin typeface="Cambria Math" panose="02040503050406030204" pitchFamily="18" charset="0"/>
+                                </a:rPr>
+                                <m:t>2</m:t>
+                              </m:r>
+                            </m:sup>
+                          </m:sSup>
+                          <m:sSub>
+                            <m:sSubPr>
+                              <m:ctrlPr>
+                                <a:rPr lang="es-MX" b="0" i="1" smtClean="0">
+                                  <a:latin typeface="Cambria Math" panose="02040503050406030204" pitchFamily="18" charset="0"/>
+                                </a:rPr>
+                              </m:ctrlPr>
+                            </m:sSubPr>
+                            <m:e>
+                              <m:r>
+                                <a:rPr lang="es-MX" b="0" i="1" smtClean="0">
+                                  <a:latin typeface="Cambria Math" panose="02040503050406030204" pitchFamily="18" charset="0"/>
+                                </a:rPr>
+                                <m:t>𝑥</m:t>
+                              </m:r>
+                            </m:e>
+                            <m:sub>
+                              <m:r>
+                                <a:rPr lang="es-MX" b="0" i="1" smtClean="0">
+                                  <a:latin typeface="Cambria Math" panose="02040503050406030204" pitchFamily="18" charset="0"/>
+                                </a:rPr>
+                                <m:t>2</m:t>
+                              </m:r>
+                            </m:sub>
+                          </m:sSub>
+                        </m:num>
+                        <m:den>
+                          <m:r>
+                            <a:rPr lang="es-MX" b="0" i="1" smtClean="0">
+                              <a:latin typeface="Cambria Math" panose="02040503050406030204" pitchFamily="18" charset="0"/>
+                            </a:rPr>
+                            <m:t>𝑑</m:t>
+                          </m:r>
+                          <m:sSup>
+                            <m:sSupPr>
+                              <m:ctrlPr>
+                                <a:rPr lang="es-MX" b="0" i="1" smtClean="0">
+                                  <a:latin typeface="Cambria Math" panose="02040503050406030204" pitchFamily="18" charset="0"/>
+                                </a:rPr>
+                              </m:ctrlPr>
+                            </m:sSupPr>
+                            <m:e>
+                              <m:r>
+                                <a:rPr lang="es-MX" b="0" i="1" smtClean="0">
+                                  <a:latin typeface="Cambria Math" panose="02040503050406030204" pitchFamily="18" charset="0"/>
+                                </a:rPr>
+                                <m:t>𝑡</m:t>
+                              </m:r>
+                            </m:e>
+                            <m:sup>
+                              <m:r>
+                                <a:rPr lang="es-MX" b="0" i="1" smtClean="0">
+                                  <a:latin typeface="Cambria Math" panose="02040503050406030204" pitchFamily="18" charset="0"/>
+                                </a:rPr>
+                                <m:t>2</m:t>
+                              </m:r>
+                            </m:sup>
+                          </m:sSup>
+                        </m:den>
+                      </m:f>
+                      <m:r>
+                        <a:rPr lang="es-MX" b="0" i="1" smtClean="0">
+                          <a:latin typeface="Cambria Math" panose="02040503050406030204" pitchFamily="18" charset="0"/>
+                        </a:rPr>
+                        <m:t>=−</m:t>
+                      </m:r>
+                      <m:sSub>
+                        <m:sSubPr>
+                          <m:ctrlPr>
+                            <a:rPr lang="es-MX" b="0" i="1" smtClean="0">
+                              <a:latin typeface="Cambria Math" panose="02040503050406030204" pitchFamily="18" charset="0"/>
+                            </a:rPr>
+                          </m:ctrlPr>
+                        </m:sSubPr>
+                        <m:e>
+                          <m:r>
+                            <a:rPr lang="es-MX" b="0" i="1" smtClean="0">
+                              <a:latin typeface="Cambria Math" panose="02040503050406030204" pitchFamily="18" charset="0"/>
+                            </a:rPr>
+                            <m:t>𝑘</m:t>
+                          </m:r>
+                        </m:e>
+                        <m:sub>
+                          <m:r>
+                            <a:rPr lang="es-MX" b="0" i="1" smtClean="0">
+                              <a:latin typeface="Cambria Math" panose="02040503050406030204" pitchFamily="18" charset="0"/>
+                            </a:rPr>
+                            <m:t>2</m:t>
+                          </m:r>
+                        </m:sub>
+                      </m:sSub>
+                      <m:r>
+                        <a:rPr lang="es-MX" b="0" i="1" smtClean="0">
+                          <a:latin typeface="Cambria Math" panose="02040503050406030204" pitchFamily="18" charset="0"/>
+                        </a:rPr>
+                        <m:t>(</m:t>
+                      </m:r>
+                      <m:sSub>
+                        <m:sSubPr>
+                          <m:ctrlPr>
+                            <a:rPr lang="es-MX" b="0" i="1" smtClean="0">
+                              <a:latin typeface="Cambria Math" panose="02040503050406030204" pitchFamily="18" charset="0"/>
+                            </a:rPr>
+                          </m:ctrlPr>
+                        </m:sSubPr>
+                        <m:e>
+                          <m:r>
+                            <a:rPr lang="es-MX" b="0" i="1" smtClean="0">
+                              <a:latin typeface="Cambria Math" panose="02040503050406030204" pitchFamily="18" charset="0"/>
+                            </a:rPr>
+                            <m:t>𝑥</m:t>
+                          </m:r>
+                        </m:e>
+                        <m:sub>
+                          <m:r>
+                            <a:rPr lang="es-MX" b="0" i="1" smtClean="0">
+                              <a:latin typeface="Cambria Math" panose="02040503050406030204" pitchFamily="18" charset="0"/>
+                            </a:rPr>
+                            <m:t>2</m:t>
+                          </m:r>
+                        </m:sub>
+                      </m:sSub>
+                      <m:r>
+                        <a:rPr lang="es-MX" b="0" i="1" smtClean="0">
+                          <a:latin typeface="Cambria Math" panose="02040503050406030204" pitchFamily="18" charset="0"/>
+                        </a:rPr>
+                        <m:t>−</m:t>
+                      </m:r>
+                      <m:sSub>
+                        <m:sSubPr>
+                          <m:ctrlPr>
+                            <a:rPr lang="es-MX" b="0" i="1" smtClean="0">
+                              <a:latin typeface="Cambria Math" panose="02040503050406030204" pitchFamily="18" charset="0"/>
+                            </a:rPr>
+                          </m:ctrlPr>
+                        </m:sSubPr>
+                        <m:e>
+                          <m:r>
+                            <a:rPr lang="es-MX" b="0" i="1" smtClean="0">
+                              <a:latin typeface="Cambria Math" panose="02040503050406030204" pitchFamily="18" charset="0"/>
+                            </a:rPr>
+                            <m:t>𝑥</m:t>
+                          </m:r>
+                        </m:e>
+                        <m:sub>
+                          <m:r>
+                            <a:rPr lang="es-MX" b="0" i="1" smtClean="0">
+                              <a:latin typeface="Cambria Math" panose="02040503050406030204" pitchFamily="18" charset="0"/>
+                            </a:rPr>
+                            <m:t>1</m:t>
+                          </m:r>
+                        </m:sub>
+                      </m:sSub>
+                      <m:r>
+                        <a:rPr lang="es-MX" b="0" i="1" smtClean="0">
+                          <a:latin typeface="Cambria Math" panose="02040503050406030204" pitchFamily="18" charset="0"/>
+                        </a:rPr>
+                        <m:t>)</m:t>
+                      </m:r>
+                    </m:oMath>
+                  </m:oMathPara>
+                </a14:m>
+                <a:endParaRPr lang="es-MX" dirty="0"/>
+              </a:p>
+            </p:txBody>
+          </p:sp>
+        </mc:Choice>
+        <mc:Fallback>
+          <p:sp>
+            <p:nvSpPr>
+              <p:cNvPr id="3" name="Marcador de contenido 2">
+                <a:extLst>
+                  <a:ext uri="{FF2B5EF4-FFF2-40B4-BE49-F238E27FC236}">
+                    <a16:creationId xmlns:a16="http://schemas.microsoft.com/office/drawing/2014/main" id="{D6CB29A0-D6AB-4E53-887C-372C6C3EB72E}"/>
+                  </a:ext>
+                </a:extLst>
+              </p:cNvPr>
+              <p:cNvSpPr>
+                <a:spLocks noGrp="1" noRot="1" noChangeAspect="1" noMove="1" noResize="1" noEditPoints="1" noAdjustHandles="1" noChangeArrowheads="1" noChangeShapeType="1" noTextEdit="1"/>
+              </p:cNvSpPr>
+              <p:nvPr>
+                <p:ph idx="1"/>
+              </p:nvPr>
+            </p:nvSpPr>
+            <p:spPr>
+              <a:xfrm>
+                <a:off x="1141413" y="1752599"/>
+                <a:ext cx="9905998" cy="3124201"/>
+              </a:xfrm>
+              <a:blipFill>
+                <a:blip r:embed="rId2"/>
+                <a:stretch>
+                  <a:fillRect l="-985"/>
+                </a:stretch>
+              </a:blipFill>
+            </p:spPr>
+            <p:txBody>
+              <a:bodyPr/>
+              <a:lstStyle/>
+              <a:p>
+                <a:r>
+                  <a:rPr lang="es-MX">
+                    <a:noFill/>
+                  </a:rPr>
+                  <a:t> </a:t>
+                </a:r>
+              </a:p>
+            </p:txBody>
+          </p:sp>
+        </mc:Fallback>
+      </mc:AlternateContent>
+      <p:pic>
+        <p:nvPicPr>
+          <p:cNvPr id="5" name="Imagen 4">
+            <a:extLst>
+              <a:ext uri="{FF2B5EF4-FFF2-40B4-BE49-F238E27FC236}">
+                <a16:creationId xmlns:a16="http://schemas.microsoft.com/office/drawing/2014/main" id="{2CF100CA-4F84-4E27-954F-D2E6FA2C87C6}"/>
+              </a:ext>
+            </a:extLst>
+          </p:cNvPr>
+          <p:cNvPicPr>
+            <a:picLocks noChangeAspect="1"/>
+          </p:cNvPicPr>
+          <p:nvPr/>
+        </p:nvPicPr>
+        <p:blipFill>
+          <a:blip r:embed="rId3"/>
+          <a:stretch>
+            <a:fillRect/>
+          </a:stretch>
+        </p:blipFill>
+        <p:spPr>
+          <a:xfrm>
+            <a:off x="8482819" y="3657599"/>
+            <a:ext cx="3208068" cy="2609062"/>
+          </a:xfrm>
+          <a:prstGeom prst="rect">
+            <a:avLst/>
+          </a:prstGeom>
+        </p:spPr>
+      </p:pic>
+    </p:spTree>
+    <p:extLst>
+      <p:ext uri="{BB962C8B-B14F-4D97-AF65-F5344CB8AC3E}">
+        <p14:creationId xmlns:p14="http://schemas.microsoft.com/office/powerpoint/2010/main" val="1621503599"/>
       </p:ext>
     </p:extLst>
   </p:cSld>

</xml_diff>

<commit_message>
Adición de la visualización
se realizo la vizualización de la solución de nuestros resultados y sus comparativas
</commit_message>
<xml_diff>
--- a/Presentación módulo 3.pptx
+++ b/Presentación módulo 3.pptx
@@ -12,8 +12,11 @@
     <p:sldId id="259" r:id="rId6"/>
     <p:sldId id="261" r:id="rId7"/>
     <p:sldId id="262" r:id="rId8"/>
-    <p:sldId id="263" r:id="rId9"/>
-    <p:sldId id="264" r:id="rId10"/>
+    <p:sldId id="265" r:id="rId9"/>
+    <p:sldId id="266" r:id="rId10"/>
+    <p:sldId id="267" r:id="rId11"/>
+    <p:sldId id="263" r:id="rId12"/>
+    <p:sldId id="264" r:id="rId13"/>
   </p:sldIdLst>
   <p:sldSz cx="12192000" cy="6858000"/>
   <p:notesSz cx="6858000" cy="9144000"/>
@@ -6559,6 +6562,345 @@
     <p:extLst>
       <p:ext uri="{BB962C8B-B14F-4D97-AF65-F5344CB8AC3E}">
         <p14:creationId xmlns:p14="http://schemas.microsoft.com/office/powerpoint/2010/main" val="1584898864"/>
+      </p:ext>
+    </p:extLst>
+  </p:cSld>
+  <p:clrMapOvr>
+    <a:masterClrMapping/>
+  </p:clrMapOvr>
+</p:sld>
+</file>
+
+<file path=ppt/slides/slide10.xml><?xml version="1.0" encoding="utf-8"?>
+<p:sld xmlns:a="http://schemas.openxmlformats.org/drawingml/2006/main" xmlns:r="http://schemas.openxmlformats.org/officeDocument/2006/relationships" xmlns:p="http://schemas.openxmlformats.org/presentationml/2006/main">
+  <p:cSld>
+    <p:spTree>
+      <p:nvGrpSpPr>
+        <p:cNvPr id="1" name=""/>
+        <p:cNvGrpSpPr/>
+        <p:nvPr/>
+      </p:nvGrpSpPr>
+      <p:grpSpPr>
+        <a:xfrm>
+          <a:off x="0" y="0"/>
+          <a:ext cx="0" cy="0"/>
+          <a:chOff x="0" y="0"/>
+          <a:chExt cx="0" cy="0"/>
+        </a:xfrm>
+      </p:grpSpPr>
+      <p:sp>
+        <p:nvSpPr>
+          <p:cNvPr id="2" name="Título 1">
+            <a:extLst>
+              <a:ext uri="{FF2B5EF4-FFF2-40B4-BE49-F238E27FC236}">
+                <a16:creationId xmlns:a16="http://schemas.microsoft.com/office/drawing/2014/main" id="{486787EA-34B2-4FA6-9C5A-CAD89B426C9C}"/>
+              </a:ext>
+            </a:extLst>
+          </p:cNvPr>
+          <p:cNvSpPr>
+            <a:spLocks noGrp="1"/>
+          </p:cNvSpPr>
+          <p:nvPr>
+            <p:ph type="title"/>
+          </p:nvPr>
+        </p:nvSpPr>
+        <p:spPr/>
+        <p:txBody>
+          <a:bodyPr/>
+          <a:lstStyle/>
+          <a:p>
+            <a:r>
+              <a:rPr lang="es-MX" dirty="0"/>
+              <a:t>Comparativa de la solución analítica y la solución numérica dada por Python.</a:t>
+            </a:r>
+          </a:p>
+        </p:txBody>
+      </p:sp>
+      <p:pic>
+        <p:nvPicPr>
+          <p:cNvPr id="3" name="Imagen 2">
+            <a:extLst>
+              <a:ext uri="{FF2B5EF4-FFF2-40B4-BE49-F238E27FC236}">
+                <a16:creationId xmlns:a16="http://schemas.microsoft.com/office/drawing/2014/main" id="{A996F0C4-D398-4EE0-9E93-C0EB177FE4AF}"/>
+              </a:ext>
+            </a:extLst>
+          </p:cNvPr>
+          <p:cNvPicPr>
+            <a:picLocks noChangeAspect="1"/>
+          </p:cNvPicPr>
+          <p:nvPr/>
+        </p:nvPicPr>
+        <p:blipFill>
+          <a:blip r:embed="rId2"/>
+          <a:stretch>
+            <a:fillRect/>
+          </a:stretch>
+        </p:blipFill>
+        <p:spPr>
+          <a:xfrm>
+            <a:off x="754108" y="2318727"/>
+            <a:ext cx="4944165" cy="3486637"/>
+          </a:xfrm>
+          <a:prstGeom prst="rect">
+            <a:avLst/>
+          </a:prstGeom>
+        </p:spPr>
+      </p:pic>
+      <p:pic>
+        <p:nvPicPr>
+          <p:cNvPr id="4" name="Imagen 3">
+            <a:extLst>
+              <a:ext uri="{FF2B5EF4-FFF2-40B4-BE49-F238E27FC236}">
+                <a16:creationId xmlns:a16="http://schemas.microsoft.com/office/drawing/2014/main" id="{B5D4B34E-30D8-422E-B3B1-A0538FA0C49B}"/>
+              </a:ext>
+            </a:extLst>
+          </p:cNvPr>
+          <p:cNvPicPr>
+            <a:picLocks noChangeAspect="1"/>
+          </p:cNvPicPr>
+          <p:nvPr/>
+        </p:nvPicPr>
+        <p:blipFill>
+          <a:blip r:embed="rId3"/>
+          <a:stretch>
+            <a:fillRect/>
+          </a:stretch>
+        </p:blipFill>
+        <p:spPr>
+          <a:xfrm>
+            <a:off x="5996023" y="2483348"/>
+            <a:ext cx="4753638" cy="3353268"/>
+          </a:xfrm>
+          <a:prstGeom prst="rect">
+            <a:avLst/>
+          </a:prstGeom>
+        </p:spPr>
+      </p:pic>
+    </p:spTree>
+    <p:extLst>
+      <p:ext uri="{BB962C8B-B14F-4D97-AF65-F5344CB8AC3E}">
+        <p14:creationId xmlns:p14="http://schemas.microsoft.com/office/powerpoint/2010/main" val="1512784384"/>
+      </p:ext>
+    </p:extLst>
+  </p:cSld>
+  <p:clrMapOvr>
+    <a:masterClrMapping/>
+  </p:clrMapOvr>
+</p:sld>
+</file>
+
+<file path=ppt/slides/slide11.xml><?xml version="1.0" encoding="utf-8"?>
+<p:sld xmlns:a="http://schemas.openxmlformats.org/drawingml/2006/main" xmlns:r="http://schemas.openxmlformats.org/officeDocument/2006/relationships" xmlns:p="http://schemas.openxmlformats.org/presentationml/2006/main">
+  <p:cSld>
+    <p:spTree>
+      <p:nvGrpSpPr>
+        <p:cNvPr id="1" name=""/>
+        <p:cNvGrpSpPr/>
+        <p:nvPr/>
+      </p:nvGrpSpPr>
+      <p:grpSpPr>
+        <a:xfrm>
+          <a:off x="0" y="0"/>
+          <a:ext cx="0" cy="0"/>
+          <a:chOff x="0" y="0"/>
+          <a:chExt cx="0" cy="0"/>
+        </a:xfrm>
+      </p:grpSpPr>
+      <p:sp>
+        <p:nvSpPr>
+          <p:cNvPr id="2" name="Título 1">
+            <a:extLst>
+              <a:ext uri="{FF2B5EF4-FFF2-40B4-BE49-F238E27FC236}">
+                <a16:creationId xmlns:a16="http://schemas.microsoft.com/office/drawing/2014/main" id="{B1B45FFF-A0C2-40ED-A784-445AE4038CD2}"/>
+              </a:ext>
+            </a:extLst>
+          </p:cNvPr>
+          <p:cNvSpPr>
+            <a:spLocks noGrp="1"/>
+          </p:cNvSpPr>
+          <p:nvPr>
+            <p:ph type="title"/>
+          </p:nvPr>
+        </p:nvSpPr>
+        <p:spPr/>
+        <p:txBody>
+          <a:bodyPr/>
+          <a:lstStyle/>
+          <a:p>
+            <a:r>
+              <a:rPr lang="es-MX" dirty="0"/>
+              <a:t>conclusión</a:t>
+            </a:r>
+          </a:p>
+        </p:txBody>
+      </p:sp>
+      <p:sp>
+        <p:nvSpPr>
+          <p:cNvPr id="3" name="Marcador de contenido 2">
+            <a:extLst>
+              <a:ext uri="{FF2B5EF4-FFF2-40B4-BE49-F238E27FC236}">
+                <a16:creationId xmlns:a16="http://schemas.microsoft.com/office/drawing/2014/main" id="{822DF433-3AD3-403C-A38C-B587BEED1FB5}"/>
+              </a:ext>
+            </a:extLst>
+          </p:cNvPr>
+          <p:cNvSpPr>
+            <a:spLocks noGrp="1"/>
+          </p:cNvSpPr>
+          <p:nvPr>
+            <p:ph idx="1"/>
+          </p:nvPr>
+        </p:nvSpPr>
+        <p:spPr/>
+        <p:txBody>
+          <a:bodyPr/>
+          <a:lstStyle/>
+          <a:p>
+            <a:r>
+              <a:rPr lang="es-ES" dirty="0"/>
+              <a:t>Se aprendió a utilizar nuevas funciones imprescindibles para la solución del problema.</a:t>
+            </a:r>
+          </a:p>
+          <a:p>
+            <a:endParaRPr lang="es-ES" dirty="0"/>
+          </a:p>
+          <a:p>
+            <a:r>
+              <a:rPr lang="es-ES" dirty="0"/>
+              <a:t>Fue posible resolver el problema de interés, tanto analíticamente como numéricamente con </a:t>
+            </a:r>
+            <a:r>
+              <a:rPr lang="es-ES" dirty="0" err="1"/>
+              <a:t>python</a:t>
+            </a:r>
+            <a:r>
+              <a:rPr lang="es-ES" dirty="0"/>
+              <a:t>.</a:t>
+            </a:r>
+          </a:p>
+          <a:p>
+            <a:endParaRPr lang="es-ES" dirty="0"/>
+          </a:p>
+          <a:p>
+            <a:r>
+              <a:rPr lang="es-ES" dirty="0"/>
+              <a:t>Se aprendió a resolver no solo esta ecuación, sino otras similares que involucren un sistema de resortes.</a:t>
+            </a:r>
+            <a:endParaRPr lang="es-MX" dirty="0"/>
+          </a:p>
+        </p:txBody>
+      </p:sp>
+    </p:spTree>
+    <p:extLst>
+      <p:ext uri="{BB962C8B-B14F-4D97-AF65-F5344CB8AC3E}">
+        <p14:creationId xmlns:p14="http://schemas.microsoft.com/office/powerpoint/2010/main" val="745074821"/>
+      </p:ext>
+    </p:extLst>
+  </p:cSld>
+  <p:clrMapOvr>
+    <a:masterClrMapping/>
+  </p:clrMapOvr>
+</p:sld>
+</file>
+
+<file path=ppt/slides/slide12.xml><?xml version="1.0" encoding="utf-8"?>
+<p:sld xmlns:a="http://schemas.openxmlformats.org/drawingml/2006/main" xmlns:r="http://schemas.openxmlformats.org/officeDocument/2006/relationships" xmlns:p="http://schemas.openxmlformats.org/presentationml/2006/main">
+  <p:cSld>
+    <p:spTree>
+      <p:nvGrpSpPr>
+        <p:cNvPr id="1" name=""/>
+        <p:cNvGrpSpPr/>
+        <p:nvPr/>
+      </p:nvGrpSpPr>
+      <p:grpSpPr>
+        <a:xfrm>
+          <a:off x="0" y="0"/>
+          <a:ext cx="0" cy="0"/>
+          <a:chOff x="0" y="0"/>
+          <a:chExt cx="0" cy="0"/>
+        </a:xfrm>
+      </p:grpSpPr>
+      <p:sp>
+        <p:nvSpPr>
+          <p:cNvPr id="2" name="Título 1">
+            <a:extLst>
+              <a:ext uri="{FF2B5EF4-FFF2-40B4-BE49-F238E27FC236}">
+                <a16:creationId xmlns:a16="http://schemas.microsoft.com/office/drawing/2014/main" id="{47E6FFF6-2115-4C79-8895-66A7C1BF5119}"/>
+              </a:ext>
+            </a:extLst>
+          </p:cNvPr>
+          <p:cNvSpPr>
+            <a:spLocks noGrp="1"/>
+          </p:cNvSpPr>
+          <p:nvPr>
+            <p:ph type="title"/>
+          </p:nvPr>
+        </p:nvSpPr>
+        <p:spPr/>
+        <p:txBody>
+          <a:bodyPr/>
+          <a:lstStyle/>
+          <a:p>
+            <a:r>
+              <a:rPr lang="es-MX" dirty="0"/>
+              <a:t>Bibliografía:</a:t>
+            </a:r>
+          </a:p>
+        </p:txBody>
+      </p:sp>
+      <p:sp>
+        <p:nvSpPr>
+          <p:cNvPr id="3" name="Marcador de contenido 2">
+            <a:extLst>
+              <a:ext uri="{FF2B5EF4-FFF2-40B4-BE49-F238E27FC236}">
+                <a16:creationId xmlns:a16="http://schemas.microsoft.com/office/drawing/2014/main" id="{3AE749AC-896E-406D-BE8A-A786DA7069DC}"/>
+              </a:ext>
+            </a:extLst>
+          </p:cNvPr>
+          <p:cNvSpPr>
+            <a:spLocks noGrp="1"/>
+          </p:cNvSpPr>
+          <p:nvPr>
+            <p:ph idx="1"/>
+          </p:nvPr>
+        </p:nvSpPr>
+        <p:spPr/>
+        <p:txBody>
+          <a:bodyPr/>
+          <a:lstStyle/>
+          <a:p>
+            <a:r>
+              <a:rPr lang="en-US" dirty="0">
+                <a:effectLst/>
+              </a:rPr>
+              <a:t>Brigham Young University. (2018). Laplace Transforms. </a:t>
+            </a:r>
+            <a:r>
+              <a:rPr lang="en-US" dirty="0" err="1">
+                <a:effectLst/>
+              </a:rPr>
+              <a:t>Recuperado</a:t>
+            </a:r>
+            <a:r>
+              <a:rPr lang="en-US" dirty="0">
+                <a:effectLst/>
+              </a:rPr>
+              <a:t> de: </a:t>
+            </a:r>
+            <a:r>
+              <a:rPr lang="en-US" u="sng" dirty="0">
+                <a:effectLst/>
+                <a:hlinkClick r:id="rId2"/>
+              </a:rPr>
+              <a:t>https://apmonitor.com/pdc/index.php/Main/LaplaceTransforms</a:t>
+            </a:r>
+            <a:endParaRPr lang="es-MX" dirty="0"/>
+          </a:p>
+        </p:txBody>
+      </p:sp>
+    </p:spTree>
+    <p:extLst>
+      <p:ext uri="{BB962C8B-B14F-4D97-AF65-F5344CB8AC3E}">
+        <p14:creationId xmlns:p14="http://schemas.microsoft.com/office/powerpoint/2010/main" val="1147627252"/>
       </p:ext>
     </p:extLst>
   </p:cSld>
@@ -7878,7 +8220,12 @@
             <p:ph type="title"/>
           </p:nvPr>
         </p:nvSpPr>
-        <p:spPr/>
+        <p:spPr>
+          <a:xfrm>
+            <a:off x="1141412" y="442170"/>
+            <a:ext cx="9268680" cy="1547873"/>
+          </a:xfrm>
+        </p:spPr>
         <p:txBody>
           <a:bodyPr/>
           <a:lstStyle/>
@@ -7906,15 +8253,97 @@
             <p:ph idx="1"/>
           </p:nvPr>
         </p:nvSpPr>
-        <p:spPr/>
-        <p:txBody>
-          <a:bodyPr/>
+        <p:spPr>
+          <a:xfrm>
+            <a:off x="1141412" y="1904998"/>
+            <a:ext cx="10028335" cy="1077353"/>
+          </a:xfrm>
+        </p:spPr>
+        <p:txBody>
+          <a:bodyPr>
+            <a:normAutofit/>
+          </a:bodyPr>
           <a:lstStyle/>
           <a:p>
-            <a:endParaRPr lang="es-MX"/>
-          </a:p>
-        </p:txBody>
-      </p:sp>
+            <a:r>
+              <a:rPr lang="es-MX" dirty="0"/>
+              <a:t>Esta son las gráficas de nuestras soluciones a las que llegamos.</a:t>
+            </a:r>
+          </a:p>
+          <a:p>
+            <a:pPr marL="0" indent="0">
+              <a:buNone/>
+            </a:pPr>
+            <a:r>
+              <a:rPr lang="es-MX" dirty="0"/>
+              <a:t>Solución numérica .</a:t>
+            </a:r>
+          </a:p>
+          <a:p>
+            <a:endParaRPr lang="es-MX" dirty="0"/>
+          </a:p>
+        </p:txBody>
+      </p:sp>
+      <p:pic>
+        <p:nvPicPr>
+          <p:cNvPr id="4" name="Imagen 3">
+            <a:extLst>
+              <a:ext uri="{FF2B5EF4-FFF2-40B4-BE49-F238E27FC236}">
+                <a16:creationId xmlns:a16="http://schemas.microsoft.com/office/drawing/2014/main" id="{6C56BEAA-3F2D-4FB5-9A5E-94CF40F7BA94}"/>
+              </a:ext>
+            </a:extLst>
+          </p:cNvPr>
+          <p:cNvPicPr>
+            <a:picLocks noChangeAspect="1"/>
+          </p:cNvPicPr>
+          <p:nvPr/>
+        </p:nvPicPr>
+        <p:blipFill>
+          <a:blip r:embed="rId2"/>
+          <a:stretch>
+            <a:fillRect/>
+          </a:stretch>
+        </p:blipFill>
+        <p:spPr>
+          <a:xfrm>
+            <a:off x="863439" y="3429000"/>
+            <a:ext cx="4491627" cy="3087431"/>
+          </a:xfrm>
+          <a:prstGeom prst="rect">
+            <a:avLst/>
+          </a:prstGeom>
+        </p:spPr>
+      </p:pic>
+      <p:pic>
+        <p:nvPicPr>
+          <p:cNvPr id="5" name="Imagen 4">
+            <a:extLst>
+              <a:ext uri="{FF2B5EF4-FFF2-40B4-BE49-F238E27FC236}">
+                <a16:creationId xmlns:a16="http://schemas.microsoft.com/office/drawing/2014/main" id="{D5ACC43D-938C-4C27-B877-5732CCC22844}"/>
+              </a:ext>
+            </a:extLst>
+          </p:cNvPr>
+          <p:cNvPicPr>
+            <a:picLocks noChangeAspect="1"/>
+          </p:cNvPicPr>
+          <p:nvPr/>
+        </p:nvPicPr>
+        <p:blipFill>
+          <a:blip r:embed="rId3"/>
+          <a:stretch>
+            <a:fillRect/>
+          </a:stretch>
+        </p:blipFill>
+        <p:spPr>
+          <a:xfrm>
+            <a:off x="5702060" y="3429000"/>
+            <a:ext cx="4384475" cy="3072585"/>
+          </a:xfrm>
+          <a:prstGeom prst="rect">
+            <a:avLst/>
+          </a:prstGeom>
+        </p:spPr>
+      </p:pic>
     </p:spTree>
     <p:extLst>
       <p:ext uri="{BB962C8B-B14F-4D97-AF65-F5344CB8AC3E}">
@@ -7945,63 +8374,70 @@
           <a:chExt cx="0" cy="0"/>
         </a:xfrm>
       </p:grpSpPr>
-      <p:sp>
-        <p:nvSpPr>
-          <p:cNvPr id="2" name="Título 1">
+      <p:pic>
+        <p:nvPicPr>
+          <p:cNvPr id="2" name="Imagen 1">
             <a:extLst>
               <a:ext uri="{FF2B5EF4-FFF2-40B4-BE49-F238E27FC236}">
-                <a16:creationId xmlns:a16="http://schemas.microsoft.com/office/drawing/2014/main" id="{B1B45FFF-A0C2-40ED-A784-445AE4038CD2}"/>
+                <a16:creationId xmlns:a16="http://schemas.microsoft.com/office/drawing/2014/main" id="{2F07326D-928C-44D3-BEB6-52663956B40A}"/>
               </a:ext>
             </a:extLst>
           </p:cNvPr>
-          <p:cNvSpPr>
-            <a:spLocks noGrp="1"/>
-          </p:cNvSpPr>
-          <p:nvPr>
-            <p:ph type="title"/>
-          </p:nvPr>
-        </p:nvSpPr>
-        <p:spPr/>
-        <p:txBody>
-          <a:bodyPr/>
-          <a:lstStyle/>
-          <a:p>
-            <a:r>
-              <a:rPr lang="es-MX" dirty="0"/>
-              <a:t>conclusión</a:t>
-            </a:r>
-          </a:p>
-        </p:txBody>
-      </p:sp>
-      <p:sp>
-        <p:nvSpPr>
-          <p:cNvPr id="3" name="Marcador de contenido 2">
+          <p:cNvPicPr>
+            <a:picLocks noChangeAspect="1"/>
+          </p:cNvPicPr>
+          <p:nvPr/>
+        </p:nvPicPr>
+        <p:blipFill>
+          <a:blip r:embed="rId2"/>
+          <a:stretch>
+            <a:fillRect/>
+          </a:stretch>
+        </p:blipFill>
+        <p:spPr>
+          <a:xfrm>
+            <a:off x="368629" y="195615"/>
+            <a:ext cx="5068007" cy="3343742"/>
+          </a:xfrm>
+          <a:prstGeom prst="rect">
+            <a:avLst/>
+          </a:prstGeom>
+        </p:spPr>
+      </p:pic>
+      <p:pic>
+        <p:nvPicPr>
+          <p:cNvPr id="3" name="Imagen 2">
             <a:extLst>
               <a:ext uri="{FF2B5EF4-FFF2-40B4-BE49-F238E27FC236}">
-                <a16:creationId xmlns:a16="http://schemas.microsoft.com/office/drawing/2014/main" id="{822DF433-3AD3-403C-A38C-B587BEED1FB5}"/>
+                <a16:creationId xmlns:a16="http://schemas.microsoft.com/office/drawing/2014/main" id="{15D4083A-B65D-405B-B6A1-9605D2A522FA}"/>
               </a:ext>
             </a:extLst>
           </p:cNvPr>
-          <p:cNvSpPr>
-            <a:spLocks noGrp="1"/>
-          </p:cNvSpPr>
-          <p:nvPr>
-            <p:ph idx="1"/>
-          </p:nvPr>
-        </p:nvSpPr>
-        <p:spPr/>
-        <p:txBody>
-          <a:bodyPr/>
-          <a:lstStyle/>
-          <a:p>
-            <a:endParaRPr lang="es-MX"/>
-          </a:p>
-        </p:txBody>
-      </p:sp>
+          <p:cNvPicPr>
+            <a:picLocks noChangeAspect="1"/>
+          </p:cNvPicPr>
+          <p:nvPr/>
+        </p:nvPicPr>
+        <p:blipFill>
+          <a:blip r:embed="rId3"/>
+          <a:stretch>
+            <a:fillRect/>
+          </a:stretch>
+        </p:blipFill>
+        <p:spPr>
+          <a:xfrm>
+            <a:off x="5650330" y="195615"/>
+            <a:ext cx="4858428" cy="3353268"/>
+          </a:xfrm>
+          <a:prstGeom prst="rect">
+            <a:avLst/>
+          </a:prstGeom>
+        </p:spPr>
+      </p:pic>
     </p:spTree>
     <p:extLst>
       <p:ext uri="{BB962C8B-B14F-4D97-AF65-F5344CB8AC3E}">
-        <p14:creationId xmlns:p14="http://schemas.microsoft.com/office/powerpoint/2010/main" val="745074821"/>
+        <p14:creationId xmlns:p14="http://schemas.microsoft.com/office/powerpoint/2010/main" val="1280332428"/>
       </p:ext>
     </p:extLst>
   </p:cSld>
@@ -8033,7 +8469,7 @@
           <p:cNvPr id="2" name="Título 1">
             <a:extLst>
               <a:ext uri="{FF2B5EF4-FFF2-40B4-BE49-F238E27FC236}">
-                <a16:creationId xmlns:a16="http://schemas.microsoft.com/office/drawing/2014/main" id="{47E6FFF6-2115-4C79-8895-66A7C1BF5119}"/>
+                <a16:creationId xmlns:a16="http://schemas.microsoft.com/office/drawing/2014/main" id="{8B071BB7-30F9-46C2-A5B7-A1FF277B3982}"/>
               </a:ext>
             </a:extLst>
           </p:cNvPr>
@@ -8044,47 +8480,87 @@
             <p:ph type="title"/>
           </p:nvPr>
         </p:nvSpPr>
-        <p:spPr/>
+        <p:spPr>
+          <a:xfrm>
+            <a:off x="1141413" y="609600"/>
+            <a:ext cx="9240544" cy="1514622"/>
+          </a:xfrm>
+        </p:spPr>
         <p:txBody>
           <a:bodyPr/>
           <a:lstStyle/>
           <a:p>
             <a:r>
               <a:rPr lang="es-MX" dirty="0"/>
-              <a:t>Bibliografía:</a:t>
-            </a:r>
-          </a:p>
-        </p:txBody>
-      </p:sp>
-      <p:sp>
-        <p:nvSpPr>
-          <p:cNvPr id="3" name="Marcador de contenido 2">
+              <a:t>Solución analítica:</a:t>
+            </a:r>
+          </a:p>
+        </p:txBody>
+      </p:sp>
+      <p:pic>
+        <p:nvPicPr>
+          <p:cNvPr id="3" name="Imagen 2">
             <a:extLst>
               <a:ext uri="{FF2B5EF4-FFF2-40B4-BE49-F238E27FC236}">
-                <a16:creationId xmlns:a16="http://schemas.microsoft.com/office/drawing/2014/main" id="{3AE749AC-896E-406D-BE8A-A786DA7069DC}"/>
+                <a16:creationId xmlns:a16="http://schemas.microsoft.com/office/drawing/2014/main" id="{CD7DDC5F-BD04-4B9F-85FC-738B7D9AACEB}"/>
               </a:ext>
             </a:extLst>
           </p:cNvPr>
-          <p:cNvSpPr>
-            <a:spLocks noGrp="1"/>
-          </p:cNvSpPr>
-          <p:nvPr>
-            <p:ph idx="1"/>
-          </p:nvPr>
-        </p:nvSpPr>
-        <p:spPr/>
-        <p:txBody>
-          <a:bodyPr/>
-          <a:lstStyle/>
-          <a:p>
-            <a:endParaRPr lang="es-MX"/>
-          </a:p>
-        </p:txBody>
-      </p:sp>
+          <p:cNvPicPr>
+            <a:picLocks noChangeAspect="1"/>
+          </p:cNvPicPr>
+          <p:nvPr/>
+        </p:nvPicPr>
+        <p:blipFill>
+          <a:blip r:embed="rId2"/>
+          <a:stretch>
+            <a:fillRect/>
+          </a:stretch>
+        </p:blipFill>
+        <p:spPr>
+          <a:xfrm>
+            <a:off x="969442" y="1753390"/>
+            <a:ext cx="4991797" cy="3372321"/>
+          </a:xfrm>
+          <a:prstGeom prst="rect">
+            <a:avLst/>
+          </a:prstGeom>
+        </p:spPr>
+      </p:pic>
+      <p:pic>
+        <p:nvPicPr>
+          <p:cNvPr id="4" name="Imagen 3">
+            <a:extLst>
+              <a:ext uri="{FF2B5EF4-FFF2-40B4-BE49-F238E27FC236}">
+                <a16:creationId xmlns:a16="http://schemas.microsoft.com/office/drawing/2014/main" id="{7CC359FB-A472-4CF6-A5F6-F306C9791440}"/>
+              </a:ext>
+            </a:extLst>
+          </p:cNvPr>
+          <p:cNvPicPr>
+            <a:picLocks noChangeAspect="1"/>
+          </p:cNvPicPr>
+          <p:nvPr/>
+        </p:nvPicPr>
+        <p:blipFill>
+          <a:blip r:embed="rId3"/>
+          <a:stretch>
+            <a:fillRect/>
+          </a:stretch>
+        </p:blipFill>
+        <p:spPr>
+          <a:xfrm>
+            <a:off x="6133210" y="1753390"/>
+            <a:ext cx="5144218" cy="3486637"/>
+          </a:xfrm>
+          <a:prstGeom prst="rect">
+            <a:avLst/>
+          </a:prstGeom>
+        </p:spPr>
+      </p:pic>
     </p:spTree>
     <p:extLst>
       <p:ext uri="{BB962C8B-B14F-4D97-AF65-F5344CB8AC3E}">
-        <p14:creationId xmlns:p14="http://schemas.microsoft.com/office/powerpoint/2010/main" val="1147627252"/>
+        <p14:creationId xmlns:p14="http://schemas.microsoft.com/office/powerpoint/2010/main" val="1686203095"/>
       </p:ext>
     </p:extLst>
   </p:cSld>

</xml_diff>

<commit_message>
Cambios a la presentación
Modifiqué el arreglo de unas diapositivas para que quedara el objetivo primero
</commit_message>
<xml_diff>
--- a/Presentación módulo 3.pptx
+++ b/Presentación módulo 3.pptx
@@ -6,8 +6,8 @@
   </p:sldMasterIdLst>
   <p:sldIdLst>
     <p:sldId id="256" r:id="rId2"/>
-    <p:sldId id="260" r:id="rId3"/>
-    <p:sldId id="257" r:id="rId4"/>
+    <p:sldId id="257" r:id="rId3"/>
+    <p:sldId id="260" r:id="rId4"/>
     <p:sldId id="258" r:id="rId5"/>
     <p:sldId id="259" r:id="rId6"/>
     <p:sldId id="261" r:id="rId7"/>
@@ -578,7 +578,7 @@
           <a:p>
             <a:fld id="{073ED0CC-082F-4160-86E5-0D6041F12778}" type="datetime1">
               <a:rPr lang="en-US" smtClean="0"/>
-              <a:t>12/1/2019</a:t>
+              <a:t>12/2/19</a:t>
             </a:fld>
             <a:endParaRPr lang="en-US" dirty="0"/>
           </a:p>
@@ -870,7 +870,7 @@
           <a:p>
             <a:fld id="{073ED0CC-082F-4160-86E5-0D6041F12778}" type="datetime1">
               <a:rPr lang="en-US" smtClean="0"/>
-              <a:t>12/1/2019</a:t>
+              <a:t>12/2/19</a:t>
             </a:fld>
             <a:endParaRPr lang="en-US" dirty="0"/>
           </a:p>
@@ -1130,7 +1130,7 @@
           <a:p>
             <a:fld id="{073ED0CC-082F-4160-86E5-0D6041F12778}" type="datetime1">
               <a:rPr lang="en-US" smtClean="0"/>
-              <a:t>12/1/2019</a:t>
+              <a:t>12/2/19</a:t>
             </a:fld>
             <a:endParaRPr lang="en-US" dirty="0"/>
           </a:p>
@@ -1600,7 +1600,7 @@
           <a:p>
             <a:fld id="{073ED0CC-082F-4160-86E5-0D6041F12778}" type="datetime1">
               <a:rPr lang="en-US" smtClean="0"/>
-              <a:t>12/1/2019</a:t>
+              <a:t>12/2/19</a:t>
             </a:fld>
             <a:endParaRPr lang="en-US" dirty="0"/>
           </a:p>
@@ -1781,7 +1781,7 @@
           <a:p>
             <a:fld id="{073ED0CC-082F-4160-86E5-0D6041F12778}" type="datetime1">
               <a:rPr lang="en-US" smtClean="0"/>
-              <a:t>12/1/2019</a:t>
+              <a:t>12/2/19</a:t>
             </a:fld>
             <a:endParaRPr lang="en-US" dirty="0"/>
           </a:p>
@@ -2358,7 +2358,7 @@
           <a:p>
             <a:fld id="{073ED0CC-082F-4160-86E5-0D6041F12778}" type="datetime1">
               <a:rPr lang="en-US" smtClean="0"/>
-              <a:t>12/1/2019</a:t>
+              <a:t>12/2/19</a:t>
             </a:fld>
             <a:endParaRPr lang="en-US" dirty="0"/>
           </a:p>
@@ -2691,7 +2691,7 @@
           <a:p>
             <a:fld id="{073ED0CC-082F-4160-86E5-0D6041F12778}" type="datetime1">
               <a:rPr lang="en-US" smtClean="0"/>
-              <a:t>12/1/2019</a:t>
+              <a:t>12/2/19</a:t>
             </a:fld>
             <a:endParaRPr lang="en-US" dirty="0"/>
           </a:p>
@@ -2867,7 +2867,7 @@
           <a:p>
             <a:fld id="{073ED0CC-082F-4160-86E5-0D6041F12778}" type="datetime1">
               <a:rPr lang="en-US" smtClean="0"/>
-              <a:t>12/1/2019</a:t>
+              <a:t>12/2/19</a:t>
             </a:fld>
             <a:endParaRPr lang="en-US" dirty="0"/>
           </a:p>
@@ -3048,7 +3048,7 @@
           <a:p>
             <a:fld id="{073ED0CC-082F-4160-86E5-0D6041F12778}" type="datetime1">
               <a:rPr lang="en-US" smtClean="0"/>
-              <a:t>12/1/2019</a:t>
+              <a:t>12/2/19</a:t>
             </a:fld>
             <a:endParaRPr lang="en-US" dirty="0"/>
           </a:p>
@@ -3219,7 +3219,7 @@
           <a:p>
             <a:fld id="{073ED0CC-082F-4160-86E5-0D6041F12778}" type="datetime1">
               <a:rPr lang="en-US" smtClean="0"/>
-              <a:t>12/1/2019</a:t>
+              <a:t>12/2/19</a:t>
             </a:fld>
             <a:endParaRPr lang="en-US" dirty="0"/>
           </a:p>
@@ -3477,7 +3477,7 @@
           <a:p>
             <a:fld id="{073ED0CC-082F-4160-86E5-0D6041F12778}" type="datetime1">
               <a:rPr lang="en-US" smtClean="0"/>
-              <a:t>12/1/2019</a:t>
+              <a:t>12/2/19</a:t>
             </a:fld>
             <a:endParaRPr lang="en-US" dirty="0"/>
           </a:p>
@@ -3770,7 +3770,7 @@
           <a:p>
             <a:fld id="{073ED0CC-082F-4160-86E5-0D6041F12778}" type="datetime1">
               <a:rPr lang="en-US" smtClean="0"/>
-              <a:t>12/1/2019</a:t>
+              <a:t>12/2/19</a:t>
             </a:fld>
             <a:endParaRPr lang="en-US" dirty="0"/>
           </a:p>
@@ -4201,7 +4201,7 @@
           <a:p>
             <a:fld id="{073ED0CC-082F-4160-86E5-0D6041F12778}" type="datetime1">
               <a:rPr lang="en-US" smtClean="0"/>
-              <a:t>12/1/2019</a:t>
+              <a:t>12/2/19</a:t>
             </a:fld>
             <a:endParaRPr lang="en-US" dirty="0"/>
           </a:p>
@@ -4320,7 +4320,7 @@
           <a:p>
             <a:fld id="{073ED0CC-082F-4160-86E5-0D6041F12778}" type="datetime1">
               <a:rPr lang="en-US" smtClean="0"/>
-              <a:t>12/1/2019</a:t>
+              <a:t>12/2/19</a:t>
             </a:fld>
             <a:endParaRPr lang="en-US" dirty="0"/>
           </a:p>
@@ -4416,7 +4416,7 @@
           <a:p>
             <a:fld id="{073ED0CC-082F-4160-86E5-0D6041F12778}" type="datetime1">
               <a:rPr lang="en-US" smtClean="0"/>
-              <a:t>12/1/2019</a:t>
+              <a:t>12/2/19</a:t>
             </a:fld>
             <a:endParaRPr lang="en-US" dirty="0"/>
           </a:p>
@@ -4700,7 +4700,7 @@
           <a:p>
             <a:fld id="{073ED0CC-082F-4160-86E5-0D6041F12778}" type="datetime1">
               <a:rPr lang="en-US" smtClean="0"/>
-              <a:t>12/1/2019</a:t>
+              <a:t>12/2/19</a:t>
             </a:fld>
             <a:endParaRPr lang="en-US" dirty="0"/>
           </a:p>
@@ -4992,7 +4992,7 @@
           <a:p>
             <a:fld id="{073ED0CC-082F-4160-86E5-0D6041F12778}" type="datetime1">
               <a:rPr lang="en-US" smtClean="0"/>
-              <a:t>12/1/2019</a:t>
+              <a:t>12/2/19</a:t>
             </a:fld>
             <a:endParaRPr lang="en-US" dirty="0"/>
           </a:p>
@@ -5224,7 +5224,7 @@
           <a:p>
             <a:fld id="{073ED0CC-082F-4160-86E5-0D6041F12778}" type="datetime1">
               <a:rPr lang="en-US" smtClean="0"/>
-              <a:t>12/1/2019</a:t>
+              <a:t>12/2/19</a:t>
             </a:fld>
             <a:endParaRPr lang="en-US" dirty="0"/>
           </a:p>
@@ -6932,7 +6932,7 @@
           <p:cNvPr id="2" name="Título 1">
             <a:extLst>
               <a:ext uri="{FF2B5EF4-FFF2-40B4-BE49-F238E27FC236}">
-                <a16:creationId xmlns:a16="http://schemas.microsoft.com/office/drawing/2014/main" id="{9101380B-039D-4911-980A-78557A2A7BFC}"/>
+                <a16:creationId xmlns:a16="http://schemas.microsoft.com/office/drawing/2014/main" id="{989A579A-3593-4A4A-80F0-673AE79A3B5B}"/>
               </a:ext>
             </a:extLst>
           </p:cNvPr>
@@ -6950,8 +6950,13 @@
           <a:p>
             <a:r>
               <a:rPr lang="es-MX" dirty="0"/>
-              <a:t>¿Qué es un sistema de resortes acoplados?</a:t>
-            </a:r>
+              <a:t>Objetivo General: </a:t>
+            </a:r>
+            <a:r>
+              <a:rPr lang="es-ES" dirty="0"/>
+              <a:t>Resolver un problema de resortes acoplados mediante el uso de ecuaciones diferenciales.</a:t>
+            </a:r>
+            <a:endParaRPr lang="es-MX" dirty="0"/>
           </a:p>
         </p:txBody>
       </p:sp>
@@ -6960,7 +6965,7 @@
           <p:cNvPr id="3" name="Marcador de contenido 2">
             <a:extLst>
               <a:ext uri="{FF2B5EF4-FFF2-40B4-BE49-F238E27FC236}">
-                <a16:creationId xmlns:a16="http://schemas.microsoft.com/office/drawing/2014/main" id="{19736CAE-E289-49E9-907B-4670DC37DBBB}"/>
+                <a16:creationId xmlns:a16="http://schemas.microsoft.com/office/drawing/2014/main" id="{E4B5FA32-4152-4BB0-BB25-59F36693AC07}"/>
               </a:ext>
             </a:extLst>
           </p:cNvPr>
@@ -6976,18 +6981,38 @@
           <a:bodyPr/>
           <a:lstStyle/>
           <a:p>
+            <a:pPr marL="0" indent="0">
+              <a:buNone/>
+            </a:pPr>
+            <a:r>
+              <a:rPr lang="es-MX" dirty="0"/>
+              <a:t>Objetivos específicos:</a:t>
+            </a:r>
+          </a:p>
+          <a:p>
             <a:r>
               <a:rPr lang="es-ES" dirty="0"/>
-              <a:t>Un sistema de resortes acoplados es aquel que consta de muchos resortes individuales interconectados entre sí. El modelo de resortes acoplados se puede aplicar tanto a sistemas mecánicos como a modelos atómicos de sólidos.</a:t>
-            </a:r>
-            <a:endParaRPr lang="es-MX" dirty="0"/>
+              <a:t>Aprender a usar el sistema de ecuaciones diferenciales aplicado a una situación de interés.</a:t>
+            </a:r>
+          </a:p>
+          <a:p>
+            <a:r>
+              <a:rPr lang="es-ES" dirty="0"/>
+              <a:t>Manejar las librerías adecuadas para obtener una solución.</a:t>
+            </a:r>
+          </a:p>
+          <a:p>
+            <a:r>
+              <a:rPr lang="es-ES" dirty="0"/>
+              <a:t>Mediante el uso de lo aprendido en el Módulo 3 resolver correctamente la ecuación de resortes acoplados.</a:t>
+            </a:r>
           </a:p>
         </p:txBody>
       </p:sp>
     </p:spTree>
     <p:extLst>
       <p:ext uri="{BB962C8B-B14F-4D97-AF65-F5344CB8AC3E}">
-        <p14:creationId xmlns:p14="http://schemas.microsoft.com/office/powerpoint/2010/main" val="3839328021"/>
+        <p14:creationId xmlns:p14="http://schemas.microsoft.com/office/powerpoint/2010/main" val="2668546851"/>
       </p:ext>
     </p:extLst>
   </p:cSld>
@@ -7019,7 +7044,7 @@
           <p:cNvPr id="2" name="Título 1">
             <a:extLst>
               <a:ext uri="{FF2B5EF4-FFF2-40B4-BE49-F238E27FC236}">
-                <a16:creationId xmlns:a16="http://schemas.microsoft.com/office/drawing/2014/main" id="{989A579A-3593-4A4A-80F0-673AE79A3B5B}"/>
+                <a16:creationId xmlns:a16="http://schemas.microsoft.com/office/drawing/2014/main" id="{9101380B-039D-4911-980A-78557A2A7BFC}"/>
               </a:ext>
             </a:extLst>
           </p:cNvPr>
@@ -7037,13 +7062,8 @@
           <a:p>
             <a:r>
               <a:rPr lang="es-MX" dirty="0"/>
-              <a:t>Objetivo General: </a:t>
-            </a:r>
-            <a:r>
-              <a:rPr lang="es-ES" dirty="0"/>
-              <a:t>Resolver un problema de resortes acoplados mediante el uso de ecuaciones diferenciales.</a:t>
-            </a:r>
-            <a:endParaRPr lang="es-MX" dirty="0"/>
+              <a:t>¿Qué es un sistema de resortes acoplados?</a:t>
+            </a:r>
           </a:p>
         </p:txBody>
       </p:sp>
@@ -7052,7 +7072,7 @@
           <p:cNvPr id="3" name="Marcador de contenido 2">
             <a:extLst>
               <a:ext uri="{FF2B5EF4-FFF2-40B4-BE49-F238E27FC236}">
-                <a16:creationId xmlns:a16="http://schemas.microsoft.com/office/drawing/2014/main" id="{E4B5FA32-4152-4BB0-BB25-59F36693AC07}"/>
+                <a16:creationId xmlns:a16="http://schemas.microsoft.com/office/drawing/2014/main" id="{19736CAE-E289-49E9-907B-4670DC37DBBB}"/>
               </a:ext>
             </a:extLst>
           </p:cNvPr>
@@ -7068,38 +7088,18 @@
           <a:bodyPr/>
           <a:lstStyle/>
           <a:p>
-            <a:pPr marL="0" indent="0">
-              <a:buNone/>
-            </a:pPr>
-            <a:r>
-              <a:rPr lang="es-MX" dirty="0"/>
-              <a:t>Objetivos específicos:</a:t>
-            </a:r>
-          </a:p>
-          <a:p>
             <a:r>
               <a:rPr lang="es-ES" dirty="0"/>
-              <a:t>Aprender a usar el sistema de ecuaciones diferenciales aplicado a una situación de interés.</a:t>
-            </a:r>
-          </a:p>
-          <a:p>
-            <a:r>
-              <a:rPr lang="es-ES" dirty="0"/>
-              <a:t>Manejar las librerías adecuadas para obtener una solución.</a:t>
-            </a:r>
-          </a:p>
-          <a:p>
-            <a:r>
-              <a:rPr lang="es-ES" dirty="0"/>
-              <a:t>Mediante el uso de lo aprendido en el Módulo 3 resolver correctamente la ecuación de resortes acoplados.</a:t>
-            </a:r>
+              <a:t>Un sistema de resortes acoplados es aquel que consta de muchos resortes individuales interconectados entre sí. El modelo de resortes acoplados se puede aplicar tanto a sistemas mecánicos como a modelos atómicos de sólidos.</a:t>
+            </a:r>
+            <a:endParaRPr lang="es-MX" dirty="0"/>
           </a:p>
         </p:txBody>
       </p:sp>
     </p:spTree>
     <p:extLst>
       <p:ext uri="{BB962C8B-B14F-4D97-AF65-F5344CB8AC3E}">
-        <p14:creationId xmlns:p14="http://schemas.microsoft.com/office/powerpoint/2010/main" val="2668546851"/>
+        <p14:creationId xmlns:p14="http://schemas.microsoft.com/office/powerpoint/2010/main" val="3839328021"/>
       </p:ext>
     </p:extLst>
   </p:cSld>

</xml_diff>

<commit_message>
Cambios a la presentación_2
Más cambios a la presentación
</commit_message>
<xml_diff>
--- a/Presentación módulo 3.pptx
+++ b/Presentación módulo 3.pptx
@@ -12,11 +12,10 @@
     <p:sldId id="259" r:id="rId6"/>
     <p:sldId id="261" r:id="rId7"/>
     <p:sldId id="262" r:id="rId8"/>
-    <p:sldId id="265" r:id="rId9"/>
-    <p:sldId id="266" r:id="rId10"/>
-    <p:sldId id="267" r:id="rId11"/>
-    <p:sldId id="263" r:id="rId12"/>
-    <p:sldId id="264" r:id="rId13"/>
+    <p:sldId id="266" r:id="rId9"/>
+    <p:sldId id="267" r:id="rId10"/>
+    <p:sldId id="263" r:id="rId11"/>
+    <p:sldId id="264" r:id="rId12"/>
   </p:sldIdLst>
   <p:sldSz cx="12192000" cy="6858000"/>
   <p:notesSz cx="6858000" cy="9144000"/>
@@ -6593,124 +6592,6 @@
           <p:cNvPr id="2" name="Título 1">
             <a:extLst>
               <a:ext uri="{FF2B5EF4-FFF2-40B4-BE49-F238E27FC236}">
-                <a16:creationId xmlns:a16="http://schemas.microsoft.com/office/drawing/2014/main" id="{486787EA-34B2-4FA6-9C5A-CAD89B426C9C}"/>
-              </a:ext>
-            </a:extLst>
-          </p:cNvPr>
-          <p:cNvSpPr>
-            <a:spLocks noGrp="1"/>
-          </p:cNvSpPr>
-          <p:nvPr>
-            <p:ph type="title"/>
-          </p:nvPr>
-        </p:nvSpPr>
-        <p:spPr/>
-        <p:txBody>
-          <a:bodyPr/>
-          <a:lstStyle/>
-          <a:p>
-            <a:r>
-              <a:rPr lang="es-MX" dirty="0"/>
-              <a:t>Comparativa de la solución analítica y la solución numérica dada por Python.</a:t>
-            </a:r>
-          </a:p>
-        </p:txBody>
-      </p:sp>
-      <p:pic>
-        <p:nvPicPr>
-          <p:cNvPr id="3" name="Imagen 2">
-            <a:extLst>
-              <a:ext uri="{FF2B5EF4-FFF2-40B4-BE49-F238E27FC236}">
-                <a16:creationId xmlns:a16="http://schemas.microsoft.com/office/drawing/2014/main" id="{A996F0C4-D398-4EE0-9E93-C0EB177FE4AF}"/>
-              </a:ext>
-            </a:extLst>
-          </p:cNvPr>
-          <p:cNvPicPr>
-            <a:picLocks noChangeAspect="1"/>
-          </p:cNvPicPr>
-          <p:nvPr/>
-        </p:nvPicPr>
-        <p:blipFill>
-          <a:blip r:embed="rId2"/>
-          <a:stretch>
-            <a:fillRect/>
-          </a:stretch>
-        </p:blipFill>
-        <p:spPr>
-          <a:xfrm>
-            <a:off x="754108" y="2318727"/>
-            <a:ext cx="4944165" cy="3486637"/>
-          </a:xfrm>
-          <a:prstGeom prst="rect">
-            <a:avLst/>
-          </a:prstGeom>
-        </p:spPr>
-      </p:pic>
-      <p:pic>
-        <p:nvPicPr>
-          <p:cNvPr id="4" name="Imagen 3">
-            <a:extLst>
-              <a:ext uri="{FF2B5EF4-FFF2-40B4-BE49-F238E27FC236}">
-                <a16:creationId xmlns:a16="http://schemas.microsoft.com/office/drawing/2014/main" id="{B5D4B34E-30D8-422E-B3B1-A0538FA0C49B}"/>
-              </a:ext>
-            </a:extLst>
-          </p:cNvPr>
-          <p:cNvPicPr>
-            <a:picLocks noChangeAspect="1"/>
-          </p:cNvPicPr>
-          <p:nvPr/>
-        </p:nvPicPr>
-        <p:blipFill>
-          <a:blip r:embed="rId3"/>
-          <a:stretch>
-            <a:fillRect/>
-          </a:stretch>
-        </p:blipFill>
-        <p:spPr>
-          <a:xfrm>
-            <a:off x="5996023" y="2483348"/>
-            <a:ext cx="4753638" cy="3353268"/>
-          </a:xfrm>
-          <a:prstGeom prst="rect">
-            <a:avLst/>
-          </a:prstGeom>
-        </p:spPr>
-      </p:pic>
-    </p:spTree>
-    <p:extLst>
-      <p:ext uri="{BB962C8B-B14F-4D97-AF65-F5344CB8AC3E}">
-        <p14:creationId xmlns:p14="http://schemas.microsoft.com/office/powerpoint/2010/main" val="1512784384"/>
-      </p:ext>
-    </p:extLst>
-  </p:cSld>
-  <p:clrMapOvr>
-    <a:masterClrMapping/>
-  </p:clrMapOvr>
-</p:sld>
-</file>
-
-<file path=ppt/slides/slide11.xml><?xml version="1.0" encoding="utf-8"?>
-<p:sld xmlns:a="http://schemas.openxmlformats.org/drawingml/2006/main" xmlns:r="http://schemas.openxmlformats.org/officeDocument/2006/relationships" xmlns:p="http://schemas.openxmlformats.org/presentationml/2006/main">
-  <p:cSld>
-    <p:spTree>
-      <p:nvGrpSpPr>
-        <p:cNvPr id="1" name=""/>
-        <p:cNvGrpSpPr/>
-        <p:nvPr/>
-      </p:nvGrpSpPr>
-      <p:grpSpPr>
-        <a:xfrm>
-          <a:off x="0" y="0"/>
-          <a:ext cx="0" cy="0"/>
-          <a:chOff x="0" y="0"/>
-          <a:chExt cx="0" cy="0"/>
-        </a:xfrm>
-      </p:grpSpPr>
-      <p:sp>
-        <p:nvSpPr>
-          <p:cNvPr id="2" name="Título 1">
-            <a:extLst>
-              <a:ext uri="{FF2B5EF4-FFF2-40B4-BE49-F238E27FC236}">
                 <a16:creationId xmlns:a16="http://schemas.microsoft.com/office/drawing/2014/main" id="{B1B45FFF-A0C2-40ED-A784-445AE4038CD2}"/>
               </a:ext>
             </a:extLst>
@@ -6802,7 +6683,7 @@
 </p:sld>
 </file>
 
-<file path=ppt/slides/slide12.xml><?xml version="1.0" encoding="utf-8"?>
+<file path=ppt/slides/slide11.xml><?xml version="1.0" encoding="utf-8"?>
 <p:sld xmlns:a="http://schemas.openxmlformats.org/drawingml/2006/main" xmlns:r="http://schemas.openxmlformats.org/officeDocument/2006/relationships" xmlns:p="http://schemas.openxmlformats.org/presentationml/2006/main">
   <p:cSld>
     <p:spTree>
@@ -8344,6 +8225,76 @@
           </a:prstGeom>
         </p:spPr>
       </p:pic>
+      <p:sp>
+        <p:nvSpPr>
+          <p:cNvPr id="6" name="CuadroTexto 5">
+            <a:extLst>
+              <a:ext uri="{FF2B5EF4-FFF2-40B4-BE49-F238E27FC236}">
+                <a16:creationId xmlns:a16="http://schemas.microsoft.com/office/drawing/2014/main" id="{D0735417-8789-6148-A9E4-95181EB94CCD}"/>
+              </a:ext>
+            </a:extLst>
+          </p:cNvPr>
+          <p:cNvSpPr txBox="1"/>
+          <p:nvPr/>
+        </p:nvSpPr>
+        <p:spPr>
+          <a:xfrm>
+            <a:off x="863439" y="2782669"/>
+            <a:ext cx="3739507" cy="646331"/>
+          </a:xfrm>
+          <a:prstGeom prst="rect">
+            <a:avLst/>
+          </a:prstGeom>
+          <a:noFill/>
+        </p:spPr>
+        <p:txBody>
+          <a:bodyPr wrap="square" rtlCol="0">
+            <a:spAutoFit/>
+          </a:bodyPr>
+          <a:lstStyle/>
+          <a:p>
+            <a:r>
+              <a:rPr lang="es-MX" dirty="0"/>
+              <a:t>Solución numérica para la masa 1 (x1)</a:t>
+            </a:r>
+          </a:p>
+        </p:txBody>
+      </p:sp>
+      <p:sp>
+        <p:nvSpPr>
+          <p:cNvPr id="7" name="CuadroTexto 6">
+            <a:extLst>
+              <a:ext uri="{FF2B5EF4-FFF2-40B4-BE49-F238E27FC236}">
+                <a16:creationId xmlns:a16="http://schemas.microsoft.com/office/drawing/2014/main" id="{5D52107E-31BD-5848-8E28-456DDF3F02CE}"/>
+              </a:ext>
+            </a:extLst>
+          </p:cNvPr>
+          <p:cNvSpPr txBox="1"/>
+          <p:nvPr/>
+        </p:nvSpPr>
+        <p:spPr>
+          <a:xfrm>
+            <a:off x="5702060" y="2760354"/>
+            <a:ext cx="3739507" cy="646331"/>
+          </a:xfrm>
+          <a:prstGeom prst="rect">
+            <a:avLst/>
+          </a:prstGeom>
+          <a:noFill/>
+        </p:spPr>
+        <p:txBody>
+          <a:bodyPr wrap="square" rtlCol="0">
+            <a:spAutoFit/>
+          </a:bodyPr>
+          <a:lstStyle/>
+          <a:p>
+            <a:r>
+              <a:rPr lang="es-MX" dirty="0"/>
+              <a:t>Solución numérica para la masa 2 (x2)</a:t>
+            </a:r>
+          </a:p>
+        </p:txBody>
+      </p:sp>
     </p:spTree>
     <p:extLst>
       <p:ext uri="{BB962C8B-B14F-4D97-AF65-F5344CB8AC3E}">
@@ -8374,96 +8325,6 @@
           <a:chExt cx="0" cy="0"/>
         </a:xfrm>
       </p:grpSpPr>
-      <p:pic>
-        <p:nvPicPr>
-          <p:cNvPr id="2" name="Imagen 1">
-            <a:extLst>
-              <a:ext uri="{FF2B5EF4-FFF2-40B4-BE49-F238E27FC236}">
-                <a16:creationId xmlns:a16="http://schemas.microsoft.com/office/drawing/2014/main" id="{2F07326D-928C-44D3-BEB6-52663956B40A}"/>
-              </a:ext>
-            </a:extLst>
-          </p:cNvPr>
-          <p:cNvPicPr>
-            <a:picLocks noChangeAspect="1"/>
-          </p:cNvPicPr>
-          <p:nvPr/>
-        </p:nvPicPr>
-        <p:blipFill>
-          <a:blip r:embed="rId2"/>
-          <a:stretch>
-            <a:fillRect/>
-          </a:stretch>
-        </p:blipFill>
-        <p:spPr>
-          <a:xfrm>
-            <a:off x="368629" y="195615"/>
-            <a:ext cx="5068007" cy="3343742"/>
-          </a:xfrm>
-          <a:prstGeom prst="rect">
-            <a:avLst/>
-          </a:prstGeom>
-        </p:spPr>
-      </p:pic>
-      <p:pic>
-        <p:nvPicPr>
-          <p:cNvPr id="3" name="Imagen 2">
-            <a:extLst>
-              <a:ext uri="{FF2B5EF4-FFF2-40B4-BE49-F238E27FC236}">
-                <a16:creationId xmlns:a16="http://schemas.microsoft.com/office/drawing/2014/main" id="{15D4083A-B65D-405B-B6A1-9605D2A522FA}"/>
-              </a:ext>
-            </a:extLst>
-          </p:cNvPr>
-          <p:cNvPicPr>
-            <a:picLocks noChangeAspect="1"/>
-          </p:cNvPicPr>
-          <p:nvPr/>
-        </p:nvPicPr>
-        <p:blipFill>
-          <a:blip r:embed="rId3"/>
-          <a:stretch>
-            <a:fillRect/>
-          </a:stretch>
-        </p:blipFill>
-        <p:spPr>
-          <a:xfrm>
-            <a:off x="5650330" y="195615"/>
-            <a:ext cx="4858428" cy="3353268"/>
-          </a:xfrm>
-          <a:prstGeom prst="rect">
-            <a:avLst/>
-          </a:prstGeom>
-        </p:spPr>
-      </p:pic>
-    </p:spTree>
-    <p:extLst>
-      <p:ext uri="{BB962C8B-B14F-4D97-AF65-F5344CB8AC3E}">
-        <p14:creationId xmlns:p14="http://schemas.microsoft.com/office/powerpoint/2010/main" val="1280332428"/>
-      </p:ext>
-    </p:extLst>
-  </p:cSld>
-  <p:clrMapOvr>
-    <a:masterClrMapping/>
-  </p:clrMapOvr>
-</p:sld>
-</file>
-
-<file path=ppt/slides/slide9.xml><?xml version="1.0" encoding="utf-8"?>
-<p:sld xmlns:a="http://schemas.openxmlformats.org/drawingml/2006/main" xmlns:r="http://schemas.openxmlformats.org/officeDocument/2006/relationships" xmlns:p="http://schemas.openxmlformats.org/presentationml/2006/main">
-  <p:cSld>
-    <p:spTree>
-      <p:nvGrpSpPr>
-        <p:cNvPr id="1" name=""/>
-        <p:cNvGrpSpPr/>
-        <p:nvPr/>
-      </p:nvGrpSpPr>
-      <p:grpSpPr>
-        <a:xfrm>
-          <a:off x="0" y="0"/>
-          <a:ext cx="0" cy="0"/>
-          <a:chOff x="0" y="0"/>
-          <a:chExt cx="0" cy="0"/>
-        </a:xfrm>
-      </p:grpSpPr>
       <p:sp>
         <p:nvSpPr>
           <p:cNvPr id="2" name="Título 1">
@@ -8519,8 +8380,8 @@
         </p:blipFill>
         <p:spPr>
           <a:xfrm>
-            <a:off x="969442" y="1753390"/>
-            <a:ext cx="4991797" cy="3372321"/>
+            <a:off x="141540" y="2706131"/>
+            <a:ext cx="5986957" cy="4044624"/>
           </a:xfrm>
           <a:prstGeom prst="rect">
             <a:avLst/>
@@ -8549,8 +8410,196 @@
         </p:blipFill>
         <p:spPr>
           <a:xfrm>
-            <a:off x="6133210" y="1753390"/>
-            <a:ext cx="5144218" cy="3486637"/>
+            <a:off x="6082984" y="2706131"/>
+            <a:ext cx="5967476" cy="4044623"/>
+          </a:xfrm>
+          <a:prstGeom prst="rect">
+            <a:avLst/>
+          </a:prstGeom>
+        </p:spPr>
+      </p:pic>
+      <p:sp>
+        <p:nvSpPr>
+          <p:cNvPr id="5" name="CuadroTexto 4">
+            <a:extLst>
+              <a:ext uri="{FF2B5EF4-FFF2-40B4-BE49-F238E27FC236}">
+                <a16:creationId xmlns:a16="http://schemas.microsoft.com/office/drawing/2014/main" id="{F6F2929A-728E-BB4F-AA51-AD20BD5AA786}"/>
+              </a:ext>
+            </a:extLst>
+          </p:cNvPr>
+          <p:cNvSpPr txBox="1"/>
+          <p:nvPr/>
+        </p:nvSpPr>
+        <p:spPr>
+          <a:xfrm>
+            <a:off x="141540" y="2059800"/>
+            <a:ext cx="3739507" cy="646331"/>
+          </a:xfrm>
+          <a:prstGeom prst="rect">
+            <a:avLst/>
+          </a:prstGeom>
+          <a:noFill/>
+        </p:spPr>
+        <p:txBody>
+          <a:bodyPr wrap="square" rtlCol="0">
+            <a:spAutoFit/>
+          </a:bodyPr>
+          <a:lstStyle/>
+          <a:p>
+            <a:r>
+              <a:rPr lang="es-MX" dirty="0"/>
+              <a:t>Solución analítica para la masa 1 (x1)</a:t>
+            </a:r>
+          </a:p>
+        </p:txBody>
+      </p:sp>
+      <p:sp>
+        <p:nvSpPr>
+          <p:cNvPr id="6" name="CuadroTexto 5">
+            <a:extLst>
+              <a:ext uri="{FF2B5EF4-FFF2-40B4-BE49-F238E27FC236}">
+                <a16:creationId xmlns:a16="http://schemas.microsoft.com/office/drawing/2014/main" id="{5C2C2A5D-0697-1A40-A627-5D15AC171721}"/>
+              </a:ext>
+            </a:extLst>
+          </p:cNvPr>
+          <p:cNvSpPr txBox="1"/>
+          <p:nvPr/>
+        </p:nvSpPr>
+        <p:spPr>
+          <a:xfrm>
+            <a:off x="6082984" y="2124222"/>
+            <a:ext cx="3739507" cy="646331"/>
+          </a:xfrm>
+          <a:prstGeom prst="rect">
+            <a:avLst/>
+          </a:prstGeom>
+          <a:noFill/>
+        </p:spPr>
+        <p:txBody>
+          <a:bodyPr wrap="square" rtlCol="0">
+            <a:spAutoFit/>
+          </a:bodyPr>
+          <a:lstStyle/>
+          <a:p>
+            <a:r>
+              <a:rPr lang="es-MX" dirty="0"/>
+              <a:t>Solución analítica para la masa 2 (x2)</a:t>
+            </a:r>
+          </a:p>
+        </p:txBody>
+      </p:sp>
+    </p:spTree>
+    <p:extLst>
+      <p:ext uri="{BB962C8B-B14F-4D97-AF65-F5344CB8AC3E}">
+        <p14:creationId xmlns:p14="http://schemas.microsoft.com/office/powerpoint/2010/main" val="1686203095"/>
+      </p:ext>
+    </p:extLst>
+  </p:cSld>
+  <p:clrMapOvr>
+    <a:masterClrMapping/>
+  </p:clrMapOvr>
+</p:sld>
+</file>
+
+<file path=ppt/slides/slide9.xml><?xml version="1.0" encoding="utf-8"?>
+<p:sld xmlns:a="http://schemas.openxmlformats.org/drawingml/2006/main" xmlns:r="http://schemas.openxmlformats.org/officeDocument/2006/relationships" xmlns:p="http://schemas.openxmlformats.org/presentationml/2006/main">
+  <p:cSld>
+    <p:spTree>
+      <p:nvGrpSpPr>
+        <p:cNvPr id="1" name=""/>
+        <p:cNvGrpSpPr/>
+        <p:nvPr/>
+      </p:nvGrpSpPr>
+      <p:grpSpPr>
+        <a:xfrm>
+          <a:off x="0" y="0"/>
+          <a:ext cx="0" cy="0"/>
+          <a:chOff x="0" y="0"/>
+          <a:chExt cx="0" cy="0"/>
+        </a:xfrm>
+      </p:grpSpPr>
+      <p:sp>
+        <p:nvSpPr>
+          <p:cNvPr id="2" name="Título 1">
+            <a:extLst>
+              <a:ext uri="{FF2B5EF4-FFF2-40B4-BE49-F238E27FC236}">
+                <a16:creationId xmlns:a16="http://schemas.microsoft.com/office/drawing/2014/main" id="{486787EA-34B2-4FA6-9C5A-CAD89B426C9C}"/>
+              </a:ext>
+            </a:extLst>
+          </p:cNvPr>
+          <p:cNvSpPr>
+            <a:spLocks noGrp="1"/>
+          </p:cNvSpPr>
+          <p:nvPr>
+            <p:ph type="title"/>
+          </p:nvPr>
+        </p:nvSpPr>
+        <p:spPr/>
+        <p:txBody>
+          <a:bodyPr/>
+          <a:lstStyle/>
+          <a:p>
+            <a:r>
+              <a:rPr lang="es-MX" dirty="0"/>
+              <a:t>Comparativa de la solución analítica y la solución numérica dada por Python.</a:t>
+            </a:r>
+          </a:p>
+        </p:txBody>
+      </p:sp>
+      <p:pic>
+        <p:nvPicPr>
+          <p:cNvPr id="3" name="Imagen 2">
+            <a:extLst>
+              <a:ext uri="{FF2B5EF4-FFF2-40B4-BE49-F238E27FC236}">
+                <a16:creationId xmlns:a16="http://schemas.microsoft.com/office/drawing/2014/main" id="{A996F0C4-D398-4EE0-9E93-C0EB177FE4AF}"/>
+              </a:ext>
+            </a:extLst>
+          </p:cNvPr>
+          <p:cNvPicPr>
+            <a:picLocks noChangeAspect="1"/>
+          </p:cNvPicPr>
+          <p:nvPr/>
+        </p:nvPicPr>
+        <p:blipFill>
+          <a:blip r:embed="rId2"/>
+          <a:stretch>
+            <a:fillRect/>
+          </a:stretch>
+        </p:blipFill>
+        <p:spPr>
+          <a:xfrm>
+            <a:off x="754108" y="2318727"/>
+            <a:ext cx="4944165" cy="3486637"/>
+          </a:xfrm>
+          <a:prstGeom prst="rect">
+            <a:avLst/>
+          </a:prstGeom>
+        </p:spPr>
+      </p:pic>
+      <p:pic>
+        <p:nvPicPr>
+          <p:cNvPr id="4" name="Imagen 3">
+            <a:extLst>
+              <a:ext uri="{FF2B5EF4-FFF2-40B4-BE49-F238E27FC236}">
+                <a16:creationId xmlns:a16="http://schemas.microsoft.com/office/drawing/2014/main" id="{B5D4B34E-30D8-422E-B3B1-A0538FA0C49B}"/>
+              </a:ext>
+            </a:extLst>
+          </p:cNvPr>
+          <p:cNvPicPr>
+            <a:picLocks noChangeAspect="1"/>
+          </p:cNvPicPr>
+          <p:nvPr/>
+        </p:nvPicPr>
+        <p:blipFill>
+          <a:blip r:embed="rId3"/>
+          <a:stretch>
+            <a:fillRect/>
+          </a:stretch>
+        </p:blipFill>
+        <p:spPr>
+          <a:xfrm>
+            <a:off x="5996023" y="2483348"/>
+            <a:ext cx="4753638" cy="3353268"/>
           </a:xfrm>
           <a:prstGeom prst="rect">
             <a:avLst/>
@@ -8560,7 +8609,7 @@
     </p:spTree>
     <p:extLst>
       <p:ext uri="{BB962C8B-B14F-4D97-AF65-F5344CB8AC3E}">
-        <p14:creationId xmlns:p14="http://schemas.microsoft.com/office/powerpoint/2010/main" val="1686203095"/>
+        <p14:creationId xmlns:p14="http://schemas.microsoft.com/office/powerpoint/2010/main" val="1512784384"/>
       </p:ext>
     </p:extLst>
   </p:cSld>

</xml_diff>

<commit_message>
Ajustes en la presentación
cambié la imagen del modelo de nuestro problema a resolver
</commit_message>
<xml_diff>
--- a/Presentación módulo 3.pptx
+++ b/Presentación módulo 3.pptx
@@ -577,7 +577,7 @@
           <a:p>
             <a:fld id="{073ED0CC-082F-4160-86E5-0D6041F12778}" type="datetime1">
               <a:rPr lang="en-US" smtClean="0"/>
-              <a:t>12/2/19</a:t>
+              <a:t>12/2/2019</a:t>
             </a:fld>
             <a:endParaRPr lang="en-US" dirty="0"/>
           </a:p>
@@ -869,7 +869,7 @@
           <a:p>
             <a:fld id="{073ED0CC-082F-4160-86E5-0D6041F12778}" type="datetime1">
               <a:rPr lang="en-US" smtClean="0"/>
-              <a:t>12/2/19</a:t>
+              <a:t>12/2/2019</a:t>
             </a:fld>
             <a:endParaRPr lang="en-US" dirty="0"/>
           </a:p>
@@ -1129,7 +1129,7 @@
           <a:p>
             <a:fld id="{073ED0CC-082F-4160-86E5-0D6041F12778}" type="datetime1">
               <a:rPr lang="en-US" smtClean="0"/>
-              <a:t>12/2/19</a:t>
+              <a:t>12/2/2019</a:t>
             </a:fld>
             <a:endParaRPr lang="en-US" dirty="0"/>
           </a:p>
@@ -1599,7 +1599,7 @@
           <a:p>
             <a:fld id="{073ED0CC-082F-4160-86E5-0D6041F12778}" type="datetime1">
               <a:rPr lang="en-US" smtClean="0"/>
-              <a:t>12/2/19</a:t>
+              <a:t>12/2/2019</a:t>
             </a:fld>
             <a:endParaRPr lang="en-US" dirty="0"/>
           </a:p>
@@ -1780,7 +1780,7 @@
           <a:p>
             <a:fld id="{073ED0CC-082F-4160-86E5-0D6041F12778}" type="datetime1">
               <a:rPr lang="en-US" smtClean="0"/>
-              <a:t>12/2/19</a:t>
+              <a:t>12/2/2019</a:t>
             </a:fld>
             <a:endParaRPr lang="en-US" dirty="0"/>
           </a:p>
@@ -2357,7 +2357,7 @@
           <a:p>
             <a:fld id="{073ED0CC-082F-4160-86E5-0D6041F12778}" type="datetime1">
               <a:rPr lang="en-US" smtClean="0"/>
-              <a:t>12/2/19</a:t>
+              <a:t>12/2/2019</a:t>
             </a:fld>
             <a:endParaRPr lang="en-US" dirty="0"/>
           </a:p>
@@ -2690,7 +2690,7 @@
           <a:p>
             <a:fld id="{073ED0CC-082F-4160-86E5-0D6041F12778}" type="datetime1">
               <a:rPr lang="en-US" smtClean="0"/>
-              <a:t>12/2/19</a:t>
+              <a:t>12/2/2019</a:t>
             </a:fld>
             <a:endParaRPr lang="en-US" dirty="0"/>
           </a:p>
@@ -2866,7 +2866,7 @@
           <a:p>
             <a:fld id="{073ED0CC-082F-4160-86E5-0D6041F12778}" type="datetime1">
               <a:rPr lang="en-US" smtClean="0"/>
-              <a:t>12/2/19</a:t>
+              <a:t>12/2/2019</a:t>
             </a:fld>
             <a:endParaRPr lang="en-US" dirty="0"/>
           </a:p>
@@ -3047,7 +3047,7 @@
           <a:p>
             <a:fld id="{073ED0CC-082F-4160-86E5-0D6041F12778}" type="datetime1">
               <a:rPr lang="en-US" smtClean="0"/>
-              <a:t>12/2/19</a:t>
+              <a:t>12/2/2019</a:t>
             </a:fld>
             <a:endParaRPr lang="en-US" dirty="0"/>
           </a:p>
@@ -3218,7 +3218,7 @@
           <a:p>
             <a:fld id="{073ED0CC-082F-4160-86E5-0D6041F12778}" type="datetime1">
               <a:rPr lang="en-US" smtClean="0"/>
-              <a:t>12/2/19</a:t>
+              <a:t>12/2/2019</a:t>
             </a:fld>
             <a:endParaRPr lang="en-US" dirty="0"/>
           </a:p>
@@ -3476,7 +3476,7 @@
           <a:p>
             <a:fld id="{073ED0CC-082F-4160-86E5-0D6041F12778}" type="datetime1">
               <a:rPr lang="en-US" smtClean="0"/>
-              <a:t>12/2/19</a:t>
+              <a:t>12/2/2019</a:t>
             </a:fld>
             <a:endParaRPr lang="en-US" dirty="0"/>
           </a:p>
@@ -3769,7 +3769,7 @@
           <a:p>
             <a:fld id="{073ED0CC-082F-4160-86E5-0D6041F12778}" type="datetime1">
               <a:rPr lang="en-US" smtClean="0"/>
-              <a:t>12/2/19</a:t>
+              <a:t>12/2/2019</a:t>
             </a:fld>
             <a:endParaRPr lang="en-US" dirty="0"/>
           </a:p>
@@ -4200,7 +4200,7 @@
           <a:p>
             <a:fld id="{073ED0CC-082F-4160-86E5-0D6041F12778}" type="datetime1">
               <a:rPr lang="en-US" smtClean="0"/>
-              <a:t>12/2/19</a:t>
+              <a:t>12/2/2019</a:t>
             </a:fld>
             <a:endParaRPr lang="en-US" dirty="0"/>
           </a:p>
@@ -4319,7 +4319,7 @@
           <a:p>
             <a:fld id="{073ED0CC-082F-4160-86E5-0D6041F12778}" type="datetime1">
               <a:rPr lang="en-US" smtClean="0"/>
-              <a:t>12/2/19</a:t>
+              <a:t>12/2/2019</a:t>
             </a:fld>
             <a:endParaRPr lang="en-US" dirty="0"/>
           </a:p>
@@ -4415,7 +4415,7 @@
           <a:p>
             <a:fld id="{073ED0CC-082F-4160-86E5-0D6041F12778}" type="datetime1">
               <a:rPr lang="en-US" smtClean="0"/>
-              <a:t>12/2/19</a:t>
+              <a:t>12/2/2019</a:t>
             </a:fld>
             <a:endParaRPr lang="en-US" dirty="0"/>
           </a:p>
@@ -4699,7 +4699,7 @@
           <a:p>
             <a:fld id="{073ED0CC-082F-4160-86E5-0D6041F12778}" type="datetime1">
               <a:rPr lang="en-US" smtClean="0"/>
-              <a:t>12/2/19</a:t>
+              <a:t>12/2/2019</a:t>
             </a:fld>
             <a:endParaRPr lang="en-US" dirty="0"/>
           </a:p>
@@ -4991,7 +4991,7 @@
           <a:p>
             <a:fld id="{073ED0CC-082F-4160-86E5-0D6041F12778}" type="datetime1">
               <a:rPr lang="en-US" smtClean="0"/>
-              <a:t>12/2/19</a:t>
+              <a:t>12/2/2019</a:t>
             </a:fld>
             <a:endParaRPr lang="en-US" dirty="0"/>
           </a:p>
@@ -5223,7 +5223,7 @@
           <a:p>
             <a:fld id="{073ED0CC-082F-4160-86E5-0D6041F12778}" type="datetime1">
               <a:rPr lang="en-US" smtClean="0"/>
-              <a:t>12/2/19</a:t>
+              <a:t>12/2/2019</a:t>
             </a:fld>
             <a:endParaRPr lang="en-US" dirty="0"/>
           </a:p>
@@ -7680,12 +7680,57 @@
           </p:sp>
         </mc:Fallback>
       </mc:AlternateContent>
+      <p:sp>
+        <p:nvSpPr>
+          <p:cNvPr id="4" name="AutoShape 2">
+            <a:extLst>
+              <a:ext uri="{FF2B5EF4-FFF2-40B4-BE49-F238E27FC236}">
+                <a16:creationId xmlns:a16="http://schemas.microsoft.com/office/drawing/2014/main" id="{AA19C2F3-879B-48A0-9E74-08ECF51B9731}"/>
+              </a:ext>
+            </a:extLst>
+          </p:cNvPr>
+          <p:cNvSpPr>
+            <a:spLocks noChangeAspect="1" noChangeArrowheads="1"/>
+          </p:cNvSpPr>
+          <p:nvPr/>
+        </p:nvSpPr>
+        <p:spPr bwMode="auto">
+          <a:xfrm>
+            <a:off x="9544929" y="3637669"/>
+            <a:ext cx="2201593" cy="2201593"/>
+          </a:xfrm>
+          <a:prstGeom prst="rect">
+            <a:avLst/>
+          </a:prstGeom>
+          <a:noFill/>
+          <a:extLst>
+            <a:ext uri="{909E8E84-426E-40DD-AFC4-6F175D3DCCD1}">
+              <a14:hiddenFill xmlns:a14="http://schemas.microsoft.com/office/drawing/2010/main">
+                <a:solidFill>
+                  <a:srgbClr val="FFFFFF"/>
+                </a:solidFill>
+              </a14:hiddenFill>
+            </a:ext>
+          </a:extLst>
+        </p:spPr>
+        <p:txBody>
+          <a:bodyPr vert="horz" wrap="square" lIns="91440" tIns="45720" rIns="91440" bIns="45720" numCol="1" anchor="t" anchorCtr="0" compatLnSpc="1">
+            <a:prstTxWarp prst="textNoShape">
+              <a:avLst/>
+            </a:prstTxWarp>
+          </a:bodyPr>
+          <a:lstStyle/>
+          <a:p>
+            <a:endParaRPr lang="es-MX"/>
+          </a:p>
+        </p:txBody>
+      </p:sp>
       <p:pic>
         <p:nvPicPr>
-          <p:cNvPr id="5" name="Imagen 4">
+          <p:cNvPr id="7" name="Imagen 6">
             <a:extLst>
               <a:ext uri="{FF2B5EF4-FFF2-40B4-BE49-F238E27FC236}">
-                <a16:creationId xmlns:a16="http://schemas.microsoft.com/office/drawing/2014/main" id="{2CF100CA-4F84-4E27-954F-D2E6FA2C87C6}"/>
+                <a16:creationId xmlns:a16="http://schemas.microsoft.com/office/drawing/2014/main" id="{B895196E-F706-4587-A7D8-4A8570422992}"/>
               </a:ext>
             </a:extLst>
           </p:cNvPr>
@@ -7702,8 +7747,8 @@
         </p:blipFill>
         <p:spPr>
           <a:xfrm>
-            <a:off x="7821637" y="3119872"/>
-            <a:ext cx="4093698" cy="3329328"/>
+            <a:off x="8354157" y="2785402"/>
+            <a:ext cx="2804161" cy="3738881"/>
           </a:xfrm>
           <a:prstGeom prst="rect">
             <a:avLst/>

</xml_diff>